<commit_message>
aggiornato proc format - seasons
</commit_message>
<xml_diff>
--- a/screenshots/imgs.pptx
+++ b/screenshots/imgs.pptx
@@ -7,6 +7,7 @@
   <p:sldIdLst>
     <p:sldId id="256" r:id="rId2"/>
     <p:sldId id="257" r:id="rId3"/>
+    <p:sldId id="258" r:id="rId4"/>
   </p:sldIdLst>
   <p:sldSz cx="12192000" cy="6858000"/>
   <p:notesSz cx="6858000" cy="9144000"/>
@@ -262,7 +263,7 @@
           <a:p>
             <a:fld id="{166DC043-4AEC-4A4E-AB79-0D54B7828DD9}" type="datetimeFigureOut">
               <a:rPr lang="en-GB" smtClean="0"/>
-              <a:t>22/04/2021</a:t>
+              <a:t>29/04/2021</a:t>
             </a:fld>
             <a:endParaRPr lang="en-GB"/>
           </a:p>
@@ -462,7 +463,7 @@
           <a:p>
             <a:fld id="{166DC043-4AEC-4A4E-AB79-0D54B7828DD9}" type="datetimeFigureOut">
               <a:rPr lang="en-GB" smtClean="0"/>
-              <a:t>22/04/2021</a:t>
+              <a:t>29/04/2021</a:t>
             </a:fld>
             <a:endParaRPr lang="en-GB"/>
           </a:p>
@@ -672,7 +673,7 @@
           <a:p>
             <a:fld id="{166DC043-4AEC-4A4E-AB79-0D54B7828DD9}" type="datetimeFigureOut">
               <a:rPr lang="en-GB" smtClean="0"/>
-              <a:t>22/04/2021</a:t>
+              <a:t>29/04/2021</a:t>
             </a:fld>
             <a:endParaRPr lang="en-GB"/>
           </a:p>
@@ -872,7 +873,7 @@
           <a:p>
             <a:fld id="{166DC043-4AEC-4A4E-AB79-0D54B7828DD9}" type="datetimeFigureOut">
               <a:rPr lang="en-GB" smtClean="0"/>
-              <a:t>22/04/2021</a:t>
+              <a:t>29/04/2021</a:t>
             </a:fld>
             <a:endParaRPr lang="en-GB"/>
           </a:p>
@@ -1148,7 +1149,7 @@
           <a:p>
             <a:fld id="{166DC043-4AEC-4A4E-AB79-0D54B7828DD9}" type="datetimeFigureOut">
               <a:rPr lang="en-GB" smtClean="0"/>
-              <a:t>22/04/2021</a:t>
+              <a:t>29/04/2021</a:t>
             </a:fld>
             <a:endParaRPr lang="en-GB"/>
           </a:p>
@@ -1416,7 +1417,7 @@
           <a:p>
             <a:fld id="{166DC043-4AEC-4A4E-AB79-0D54B7828DD9}" type="datetimeFigureOut">
               <a:rPr lang="en-GB" smtClean="0"/>
-              <a:t>22/04/2021</a:t>
+              <a:t>29/04/2021</a:t>
             </a:fld>
             <a:endParaRPr lang="en-GB"/>
           </a:p>
@@ -1831,7 +1832,7 @@
           <a:p>
             <a:fld id="{166DC043-4AEC-4A4E-AB79-0D54B7828DD9}" type="datetimeFigureOut">
               <a:rPr lang="en-GB" smtClean="0"/>
-              <a:t>22/04/2021</a:t>
+              <a:t>29/04/2021</a:t>
             </a:fld>
             <a:endParaRPr lang="en-GB"/>
           </a:p>
@@ -1973,7 +1974,7 @@
           <a:p>
             <a:fld id="{166DC043-4AEC-4A4E-AB79-0D54B7828DD9}" type="datetimeFigureOut">
               <a:rPr lang="en-GB" smtClean="0"/>
-              <a:t>22/04/2021</a:t>
+              <a:t>29/04/2021</a:t>
             </a:fld>
             <a:endParaRPr lang="en-GB"/>
           </a:p>
@@ -2086,7 +2087,7 @@
           <a:p>
             <a:fld id="{166DC043-4AEC-4A4E-AB79-0D54B7828DD9}" type="datetimeFigureOut">
               <a:rPr lang="en-GB" smtClean="0"/>
-              <a:t>22/04/2021</a:t>
+              <a:t>29/04/2021</a:t>
             </a:fld>
             <a:endParaRPr lang="en-GB"/>
           </a:p>
@@ -2399,7 +2400,7 @@
           <a:p>
             <a:fld id="{166DC043-4AEC-4A4E-AB79-0D54B7828DD9}" type="datetimeFigureOut">
               <a:rPr lang="en-GB" smtClean="0"/>
-              <a:t>22/04/2021</a:t>
+              <a:t>29/04/2021</a:t>
             </a:fld>
             <a:endParaRPr lang="en-GB"/>
           </a:p>
@@ -2688,7 +2689,7 @@
           <a:p>
             <a:fld id="{166DC043-4AEC-4A4E-AB79-0D54B7828DD9}" type="datetimeFigureOut">
               <a:rPr lang="en-GB" smtClean="0"/>
-              <a:t>22/04/2021</a:t>
+              <a:t>29/04/2021</a:t>
             </a:fld>
             <a:endParaRPr lang="en-GB"/>
           </a:p>
@@ -2931,7 +2932,7 @@
           <a:p>
             <a:fld id="{166DC043-4AEC-4A4E-AB79-0D54B7828DD9}" type="datetimeFigureOut">
               <a:rPr lang="en-GB" smtClean="0"/>
-              <a:t>22/04/2021</a:t>
+              <a:t>29/04/2021</a:t>
             </a:fld>
             <a:endParaRPr lang="en-GB"/>
           </a:p>
@@ -4207,6 +4208,290 @@
 </p:sld>
 </file>
 
+<file path=ppt/slides/slide3.xml><?xml version="1.0" encoding="utf-8"?>
+<p:sld xmlns:a="http://schemas.openxmlformats.org/drawingml/2006/main" xmlns:r="http://schemas.openxmlformats.org/officeDocument/2006/relationships" xmlns:p="http://schemas.openxmlformats.org/presentationml/2006/main">
+  <p:cSld>
+    <p:spTree>
+      <p:nvGrpSpPr>
+        <p:cNvPr id="1" name=""/>
+        <p:cNvGrpSpPr/>
+        <p:nvPr/>
+      </p:nvGrpSpPr>
+      <p:grpSpPr>
+        <a:xfrm>
+          <a:off x="0" y="0"/>
+          <a:ext cx="0" cy="0"/>
+          <a:chOff x="0" y="0"/>
+          <a:chExt cx="0" cy="0"/>
+        </a:xfrm>
+      </p:grpSpPr>
+      <p:pic>
+        <p:nvPicPr>
+          <p:cNvPr id="7" name="Picture 6" descr="Table&#10;&#10;Description automatically generated">
+            <a:extLst>
+              <a:ext uri="{FF2B5EF4-FFF2-40B4-BE49-F238E27FC236}">
+                <a16:creationId xmlns:a16="http://schemas.microsoft.com/office/drawing/2014/main" id="{A80CF4A5-9CAD-40DF-8DB7-E70F50138746}"/>
+              </a:ext>
+            </a:extLst>
+          </p:cNvPr>
+          <p:cNvPicPr>
+            <a:picLocks noChangeAspect="1"/>
+          </p:cNvPicPr>
+          <p:nvPr/>
+        </p:nvPicPr>
+        <p:blipFill rotWithShape="1">
+          <a:blip r:embed="rId2">
+            <a:extLst>
+              <a:ext uri="{28A0092B-C50C-407E-A947-70E740481C1C}">
+                <a14:useLocalDpi xmlns:a14="http://schemas.microsoft.com/office/drawing/2010/main" val="0"/>
+              </a:ext>
+            </a:extLst>
+          </a:blip>
+          <a:srcRect t="55987" r="553"/>
+          <a:stretch/>
+        </p:blipFill>
+        <p:spPr>
+          <a:xfrm>
+            <a:off x="3471808" y="751562"/>
+            <a:ext cx="5248383" cy="2104779"/>
+          </a:xfrm>
+          <a:prstGeom prst="rect">
+            <a:avLst/>
+          </a:prstGeom>
+        </p:spPr>
+      </p:pic>
+      <p:pic>
+        <p:nvPicPr>
+          <p:cNvPr id="5" name="Picture 4" descr="Table&#10;&#10;Description automatically generated">
+            <a:extLst>
+              <a:ext uri="{FF2B5EF4-FFF2-40B4-BE49-F238E27FC236}">
+                <a16:creationId xmlns:a16="http://schemas.microsoft.com/office/drawing/2014/main" id="{14172FBA-9522-49E2-AD19-5DD4755FF20E}"/>
+              </a:ext>
+            </a:extLst>
+          </p:cNvPr>
+          <p:cNvPicPr>
+            <a:picLocks noChangeAspect="1"/>
+          </p:cNvPicPr>
+          <p:nvPr/>
+        </p:nvPicPr>
+        <p:blipFill rotWithShape="1">
+          <a:blip r:embed="rId2">
+            <a:extLst>
+              <a:ext uri="{28A0092B-C50C-407E-A947-70E740481C1C}">
+                <a14:useLocalDpi xmlns:a14="http://schemas.microsoft.com/office/drawing/2010/main" val="0"/>
+              </a:ext>
+            </a:extLst>
+          </a:blip>
+          <a:srcRect r="553" b="55987"/>
+          <a:stretch/>
+        </p:blipFill>
+        <p:spPr>
+          <a:xfrm>
+            <a:off x="3457206" y="-1303113"/>
+            <a:ext cx="5248383" cy="2104779"/>
+          </a:xfrm>
+          <a:prstGeom prst="rect">
+            <a:avLst/>
+          </a:prstGeom>
+        </p:spPr>
+      </p:pic>
+      <p:pic>
+        <p:nvPicPr>
+          <p:cNvPr id="9" name="Picture 8" descr="Table&#10;&#10;Description automatically generated">
+            <a:extLst>
+              <a:ext uri="{FF2B5EF4-FFF2-40B4-BE49-F238E27FC236}">
+                <a16:creationId xmlns:a16="http://schemas.microsoft.com/office/drawing/2014/main" id="{407E4780-28D7-4C94-9BF9-14587256D67E}"/>
+              </a:ext>
+            </a:extLst>
+          </p:cNvPr>
+          <p:cNvPicPr>
+            <a:picLocks noChangeAspect="1"/>
+          </p:cNvPicPr>
+          <p:nvPr/>
+        </p:nvPicPr>
+        <p:blipFill rotWithShape="1">
+          <a:blip r:embed="rId3">
+            <a:extLst>
+              <a:ext uri="{28A0092B-C50C-407E-A947-70E740481C1C}">
+                <a14:useLocalDpi xmlns:a14="http://schemas.microsoft.com/office/drawing/2010/main" val="0"/>
+              </a:ext>
+            </a:extLst>
+          </a:blip>
+          <a:srcRect t="5803" r="-80" b="55655"/>
+          <a:stretch/>
+        </p:blipFill>
+        <p:spPr>
+          <a:xfrm>
+            <a:off x="3407102" y="2843408"/>
+            <a:ext cx="5248382" cy="1942348"/>
+          </a:xfrm>
+          <a:prstGeom prst="rect">
+            <a:avLst/>
+          </a:prstGeom>
+        </p:spPr>
+      </p:pic>
+      <p:pic>
+        <p:nvPicPr>
+          <p:cNvPr id="11" name="Picture 10" descr="Table&#10;&#10;Description automatically generated">
+            <a:extLst>
+              <a:ext uri="{FF2B5EF4-FFF2-40B4-BE49-F238E27FC236}">
+                <a16:creationId xmlns:a16="http://schemas.microsoft.com/office/drawing/2014/main" id="{3412C276-253E-4EF7-A951-63EC8D78427E}"/>
+              </a:ext>
+            </a:extLst>
+          </p:cNvPr>
+          <p:cNvPicPr>
+            <a:picLocks noChangeAspect="1"/>
+          </p:cNvPicPr>
+          <p:nvPr/>
+        </p:nvPicPr>
+        <p:blipFill rotWithShape="1">
+          <a:blip r:embed="rId3">
+            <a:extLst>
+              <a:ext uri="{28A0092B-C50C-407E-A947-70E740481C1C}">
+                <a14:useLocalDpi xmlns:a14="http://schemas.microsoft.com/office/drawing/2010/main" val="0"/>
+              </a:ext>
+            </a:extLst>
+          </a:blip>
+          <a:srcRect t="58234"/>
+          <a:stretch/>
+        </p:blipFill>
+        <p:spPr>
+          <a:xfrm>
+            <a:off x="3415393" y="4808436"/>
+            <a:ext cx="5210902" cy="2104779"/>
+          </a:xfrm>
+          <a:prstGeom prst="rect">
+            <a:avLst/>
+          </a:prstGeom>
+        </p:spPr>
+      </p:pic>
+      <p:cxnSp>
+        <p:nvCxnSpPr>
+          <p:cNvPr id="15" name="Straight Connector 14">
+            <a:extLst>
+              <a:ext uri="{FF2B5EF4-FFF2-40B4-BE49-F238E27FC236}">
+                <a16:creationId xmlns:a16="http://schemas.microsoft.com/office/drawing/2014/main" id="{0E6BD57E-4B1E-478B-AA91-A91C8ADF78F0}"/>
+              </a:ext>
+            </a:extLst>
+          </p:cNvPr>
+          <p:cNvCxnSpPr>
+            <a:cxnSpLocks/>
+          </p:cNvCxnSpPr>
+          <p:nvPr/>
+        </p:nvCxnSpPr>
+        <p:spPr>
+          <a:xfrm flipH="1">
+            <a:off x="3156559" y="801666"/>
+            <a:ext cx="5699342" cy="0"/>
+          </a:xfrm>
+          <a:prstGeom prst="line">
+            <a:avLst/>
+          </a:prstGeom>
+        </p:spPr>
+        <p:style>
+          <a:lnRef idx="3">
+            <a:schemeClr val="dk1"/>
+          </a:lnRef>
+          <a:fillRef idx="0">
+            <a:schemeClr val="dk1"/>
+          </a:fillRef>
+          <a:effectRef idx="2">
+            <a:schemeClr val="dk1"/>
+          </a:effectRef>
+          <a:fontRef idx="minor">
+            <a:schemeClr val="tx1"/>
+          </a:fontRef>
+        </p:style>
+      </p:cxnSp>
+      <p:cxnSp>
+        <p:nvCxnSpPr>
+          <p:cNvPr id="17" name="Straight Connector 16">
+            <a:extLst>
+              <a:ext uri="{FF2B5EF4-FFF2-40B4-BE49-F238E27FC236}">
+                <a16:creationId xmlns:a16="http://schemas.microsoft.com/office/drawing/2014/main" id="{D7E35BD1-3FC7-4CE4-85ED-3A240F1856DC}"/>
+              </a:ext>
+            </a:extLst>
+          </p:cNvPr>
+          <p:cNvCxnSpPr>
+            <a:cxnSpLocks/>
+          </p:cNvCxnSpPr>
+          <p:nvPr/>
+        </p:nvCxnSpPr>
+        <p:spPr>
+          <a:xfrm flipH="1" flipV="1">
+            <a:off x="3156559" y="2832970"/>
+            <a:ext cx="5789112" cy="23371"/>
+          </a:xfrm>
+          <a:prstGeom prst="line">
+            <a:avLst/>
+          </a:prstGeom>
+        </p:spPr>
+        <p:style>
+          <a:lnRef idx="3">
+            <a:schemeClr val="dk1"/>
+          </a:lnRef>
+          <a:fillRef idx="0">
+            <a:schemeClr val="dk1"/>
+          </a:fillRef>
+          <a:effectRef idx="2">
+            <a:schemeClr val="dk1"/>
+          </a:effectRef>
+          <a:fontRef idx="minor">
+            <a:schemeClr val="tx1"/>
+          </a:fontRef>
+        </p:style>
+      </p:cxnSp>
+      <p:cxnSp>
+        <p:nvCxnSpPr>
+          <p:cNvPr id="18" name="Straight Connector 17">
+            <a:extLst>
+              <a:ext uri="{FF2B5EF4-FFF2-40B4-BE49-F238E27FC236}">
+                <a16:creationId xmlns:a16="http://schemas.microsoft.com/office/drawing/2014/main" id="{16BB40FB-D46B-40B7-8CDB-CF4216C8244E}"/>
+              </a:ext>
+            </a:extLst>
+          </p:cNvPr>
+          <p:cNvCxnSpPr>
+            <a:cxnSpLocks/>
+          </p:cNvCxnSpPr>
+          <p:nvPr/>
+        </p:nvCxnSpPr>
+        <p:spPr>
+          <a:xfrm flipH="1">
+            <a:off x="3246329" y="4808436"/>
+            <a:ext cx="5699342" cy="0"/>
+          </a:xfrm>
+          <a:prstGeom prst="line">
+            <a:avLst/>
+          </a:prstGeom>
+        </p:spPr>
+        <p:style>
+          <a:lnRef idx="3">
+            <a:schemeClr val="dk1"/>
+          </a:lnRef>
+          <a:fillRef idx="0">
+            <a:schemeClr val="dk1"/>
+          </a:fillRef>
+          <a:effectRef idx="2">
+            <a:schemeClr val="dk1"/>
+          </a:effectRef>
+          <a:fontRef idx="minor">
+            <a:schemeClr val="tx1"/>
+          </a:fontRef>
+        </p:style>
+      </p:cxnSp>
+    </p:spTree>
+    <p:extLst>
+      <p:ext uri="{BB962C8B-B14F-4D97-AF65-F5344CB8AC3E}">
+        <p14:creationId xmlns:p14="http://schemas.microsoft.com/office/powerpoint/2010/main" val="558672315"/>
+      </p:ext>
+    </p:extLst>
+  </p:cSld>
+  <p:clrMapOvr>
+    <a:masterClrMapping/>
+  </p:clrMapOvr>
+</p:sld>
+</file>
+
 <file path=ppt/theme/theme1.xml><?xml version="1.0" encoding="utf-8"?>
 <a:theme xmlns:a="http://schemas.openxmlformats.org/drawingml/2006/main" name="Office Theme">
   <a:themeElements>

</xml_diff>

<commit_message>
upd img +  new sect features
</commit_message>
<xml_diff>
--- a/screenshots/imgs.pptx
+++ b/screenshots/imgs.pptx
@@ -8,6 +8,7 @@
     <p:sldId id="256" r:id="rId2"/>
     <p:sldId id="257" r:id="rId3"/>
     <p:sldId id="258" r:id="rId4"/>
+    <p:sldId id="259" r:id="rId5"/>
   </p:sldIdLst>
   <p:sldSz cx="12192000" cy="6858000"/>
   <p:notesSz cx="6858000" cy="9144000"/>
@@ -263,7 +264,7 @@
           <a:p>
             <a:fld id="{166DC043-4AEC-4A4E-AB79-0D54B7828DD9}" type="datetimeFigureOut">
               <a:rPr lang="en-GB" smtClean="0"/>
-              <a:t>29/04/2021</a:t>
+              <a:t>03/05/2021</a:t>
             </a:fld>
             <a:endParaRPr lang="en-GB"/>
           </a:p>
@@ -463,7 +464,7 @@
           <a:p>
             <a:fld id="{166DC043-4AEC-4A4E-AB79-0D54B7828DD9}" type="datetimeFigureOut">
               <a:rPr lang="en-GB" smtClean="0"/>
-              <a:t>29/04/2021</a:t>
+              <a:t>03/05/2021</a:t>
             </a:fld>
             <a:endParaRPr lang="en-GB"/>
           </a:p>
@@ -673,7 +674,7 @@
           <a:p>
             <a:fld id="{166DC043-4AEC-4A4E-AB79-0D54B7828DD9}" type="datetimeFigureOut">
               <a:rPr lang="en-GB" smtClean="0"/>
-              <a:t>29/04/2021</a:t>
+              <a:t>03/05/2021</a:t>
             </a:fld>
             <a:endParaRPr lang="en-GB"/>
           </a:p>
@@ -873,7 +874,7 @@
           <a:p>
             <a:fld id="{166DC043-4AEC-4A4E-AB79-0D54B7828DD9}" type="datetimeFigureOut">
               <a:rPr lang="en-GB" smtClean="0"/>
-              <a:t>29/04/2021</a:t>
+              <a:t>03/05/2021</a:t>
             </a:fld>
             <a:endParaRPr lang="en-GB"/>
           </a:p>
@@ -1149,7 +1150,7 @@
           <a:p>
             <a:fld id="{166DC043-4AEC-4A4E-AB79-0D54B7828DD9}" type="datetimeFigureOut">
               <a:rPr lang="en-GB" smtClean="0"/>
-              <a:t>29/04/2021</a:t>
+              <a:t>03/05/2021</a:t>
             </a:fld>
             <a:endParaRPr lang="en-GB"/>
           </a:p>
@@ -1417,7 +1418,7 @@
           <a:p>
             <a:fld id="{166DC043-4AEC-4A4E-AB79-0D54B7828DD9}" type="datetimeFigureOut">
               <a:rPr lang="en-GB" smtClean="0"/>
-              <a:t>29/04/2021</a:t>
+              <a:t>03/05/2021</a:t>
             </a:fld>
             <a:endParaRPr lang="en-GB"/>
           </a:p>
@@ -1832,7 +1833,7 @@
           <a:p>
             <a:fld id="{166DC043-4AEC-4A4E-AB79-0D54B7828DD9}" type="datetimeFigureOut">
               <a:rPr lang="en-GB" smtClean="0"/>
-              <a:t>29/04/2021</a:t>
+              <a:t>03/05/2021</a:t>
             </a:fld>
             <a:endParaRPr lang="en-GB"/>
           </a:p>
@@ -1974,7 +1975,7 @@
           <a:p>
             <a:fld id="{166DC043-4AEC-4A4E-AB79-0D54B7828DD9}" type="datetimeFigureOut">
               <a:rPr lang="en-GB" smtClean="0"/>
-              <a:t>29/04/2021</a:t>
+              <a:t>03/05/2021</a:t>
             </a:fld>
             <a:endParaRPr lang="en-GB"/>
           </a:p>
@@ -2087,7 +2088,7 @@
           <a:p>
             <a:fld id="{166DC043-4AEC-4A4E-AB79-0D54B7828DD9}" type="datetimeFigureOut">
               <a:rPr lang="en-GB" smtClean="0"/>
-              <a:t>29/04/2021</a:t>
+              <a:t>03/05/2021</a:t>
             </a:fld>
             <a:endParaRPr lang="en-GB"/>
           </a:p>
@@ -2400,7 +2401,7 @@
           <a:p>
             <a:fld id="{166DC043-4AEC-4A4E-AB79-0D54B7828DD9}" type="datetimeFigureOut">
               <a:rPr lang="en-GB" smtClean="0"/>
-              <a:t>29/04/2021</a:t>
+              <a:t>03/05/2021</a:t>
             </a:fld>
             <a:endParaRPr lang="en-GB"/>
           </a:p>
@@ -2689,7 +2690,7 @@
           <a:p>
             <a:fld id="{166DC043-4AEC-4A4E-AB79-0D54B7828DD9}" type="datetimeFigureOut">
               <a:rPr lang="en-GB" smtClean="0"/>
-              <a:t>29/04/2021</a:t>
+              <a:t>03/05/2021</a:t>
             </a:fld>
             <a:endParaRPr lang="en-GB"/>
           </a:p>
@@ -2932,7 +2933,7 @@
           <a:p>
             <a:fld id="{166DC043-4AEC-4A4E-AB79-0D54B7828DD9}" type="datetimeFigureOut">
               <a:rPr lang="en-GB" smtClean="0"/>
-              <a:t>29/04/2021</a:t>
+              <a:t>03/05/2021</a:t>
             </a:fld>
             <a:endParaRPr lang="en-GB"/>
           </a:p>
@@ -4492,6 +4493,346 @@
 </p:sld>
 </file>
 
+<file path=ppt/slides/slide4.xml><?xml version="1.0" encoding="utf-8"?>
+<p:sld xmlns:a="http://schemas.openxmlformats.org/drawingml/2006/main" xmlns:r="http://schemas.openxmlformats.org/officeDocument/2006/relationships" xmlns:p="http://schemas.openxmlformats.org/presentationml/2006/main">
+  <p:cSld>
+    <p:spTree>
+      <p:nvGrpSpPr>
+        <p:cNvPr id="1" name=""/>
+        <p:cNvGrpSpPr/>
+        <p:nvPr/>
+      </p:nvGrpSpPr>
+      <p:grpSpPr>
+        <a:xfrm>
+          <a:off x="0" y="0"/>
+          <a:ext cx="0" cy="0"/>
+          <a:chOff x="0" y="0"/>
+          <a:chExt cx="0" cy="0"/>
+        </a:xfrm>
+      </p:grpSpPr>
+      <p:pic>
+        <p:nvPicPr>
+          <p:cNvPr id="5" name="Picture 4" descr="A picture containing table&#10;&#10;Description automatically generated">
+            <a:extLst>
+              <a:ext uri="{FF2B5EF4-FFF2-40B4-BE49-F238E27FC236}">
+                <a16:creationId xmlns:a16="http://schemas.microsoft.com/office/drawing/2014/main" id="{B0E56D76-DB84-433B-8607-7A4F0780D70B}"/>
+              </a:ext>
+            </a:extLst>
+          </p:cNvPr>
+          <p:cNvPicPr>
+            <a:picLocks noChangeAspect="1"/>
+          </p:cNvPicPr>
+          <p:nvPr/>
+        </p:nvPicPr>
+        <p:blipFill>
+          <a:blip r:embed="rId2">
+            <a:extLst>
+              <a:ext uri="{28A0092B-C50C-407E-A947-70E740481C1C}">
+                <a14:useLocalDpi xmlns:a14="http://schemas.microsoft.com/office/drawing/2010/main" val="0"/>
+              </a:ext>
+            </a:extLst>
+          </a:blip>
+          <a:stretch>
+            <a:fillRect/>
+          </a:stretch>
+        </p:blipFill>
+        <p:spPr>
+          <a:xfrm>
+            <a:off x="-4125172" y="1626818"/>
+            <a:ext cx="17516549" cy="2530962"/>
+          </a:xfrm>
+          <a:prstGeom prst="rect">
+            <a:avLst/>
+          </a:prstGeom>
+        </p:spPr>
+      </p:pic>
+      <p:sp>
+        <p:nvSpPr>
+          <p:cNvPr id="6" name="Rectangle 5">
+            <a:extLst>
+              <a:ext uri="{FF2B5EF4-FFF2-40B4-BE49-F238E27FC236}">
+                <a16:creationId xmlns:a16="http://schemas.microsoft.com/office/drawing/2014/main" id="{DAC47E80-8820-443E-AFAE-77C064CFF94B}"/>
+              </a:ext>
+            </a:extLst>
+          </p:cNvPr>
+          <p:cNvSpPr/>
+          <p:nvPr/>
+        </p:nvSpPr>
+        <p:spPr>
+          <a:xfrm>
+            <a:off x="-3454401" y="1409700"/>
+            <a:ext cx="5442857" cy="3048000"/>
+          </a:xfrm>
+          <a:prstGeom prst="rect">
+            <a:avLst/>
+          </a:prstGeom>
+          <a:solidFill>
+            <a:schemeClr val="accent3">
+              <a:alpha val="30000"/>
+            </a:schemeClr>
+          </a:solidFill>
+          <a:ln>
+            <a:solidFill>
+              <a:schemeClr val="tx2"/>
+            </a:solidFill>
+          </a:ln>
+        </p:spPr>
+        <p:style>
+          <a:lnRef idx="0">
+            <a:scrgbClr r="0" g="0" b="0"/>
+          </a:lnRef>
+          <a:fillRef idx="0">
+            <a:scrgbClr r="0" g="0" b="0"/>
+          </a:fillRef>
+          <a:effectRef idx="0">
+            <a:scrgbClr r="0" g="0" b="0"/>
+          </a:effectRef>
+          <a:fontRef idx="minor">
+            <a:schemeClr val="lt1"/>
+          </a:fontRef>
+        </p:style>
+        <p:txBody>
+          <a:bodyPr rtlCol="0" anchor="ctr"/>
+          <a:lstStyle/>
+          <a:p>
+            <a:pPr algn="ctr"/>
+            <a:endParaRPr lang="en-GB"/>
+          </a:p>
+        </p:txBody>
+      </p:sp>
+      <p:sp>
+        <p:nvSpPr>
+          <p:cNvPr id="7" name="Rectangle: Rounded Corners 6">
+            <a:extLst>
+              <a:ext uri="{FF2B5EF4-FFF2-40B4-BE49-F238E27FC236}">
+                <a16:creationId xmlns:a16="http://schemas.microsoft.com/office/drawing/2014/main" id="{A7A117E0-FBB9-4C08-A7DD-51B8F912BCDC}"/>
+              </a:ext>
+            </a:extLst>
+          </p:cNvPr>
+          <p:cNvSpPr/>
+          <p:nvPr/>
+        </p:nvSpPr>
+        <p:spPr>
+          <a:xfrm>
+            <a:off x="1988457" y="1447800"/>
+            <a:ext cx="11257644" cy="3048000"/>
+          </a:xfrm>
+          <a:prstGeom prst="roundRect">
+            <a:avLst/>
+          </a:prstGeom>
+          <a:solidFill>
+            <a:schemeClr val="accent4">
+              <a:alpha val="30000"/>
+            </a:schemeClr>
+          </a:solidFill>
+          <a:ln>
+            <a:solidFill>
+              <a:schemeClr val="accent2">
+                <a:lumMod val="50000"/>
+              </a:schemeClr>
+            </a:solidFill>
+          </a:ln>
+        </p:spPr>
+        <p:style>
+          <a:lnRef idx="0">
+            <a:scrgbClr r="0" g="0" b="0"/>
+          </a:lnRef>
+          <a:fillRef idx="0">
+            <a:scrgbClr r="0" g="0" b="0"/>
+          </a:fillRef>
+          <a:effectRef idx="0">
+            <a:scrgbClr r="0" g="0" b="0"/>
+          </a:effectRef>
+          <a:fontRef idx="minor">
+            <a:schemeClr val="lt1"/>
+          </a:fontRef>
+        </p:style>
+        <p:txBody>
+          <a:bodyPr rtlCol="0" anchor="ctr"/>
+          <a:lstStyle/>
+          <a:p>
+            <a:pPr algn="ctr"/>
+            <a:endParaRPr lang="en-GB"/>
+          </a:p>
+        </p:txBody>
+      </p:sp>
+      <p:cxnSp>
+        <p:nvCxnSpPr>
+          <p:cNvPr id="11" name="Straight Arrow Connector 10">
+            <a:extLst>
+              <a:ext uri="{FF2B5EF4-FFF2-40B4-BE49-F238E27FC236}">
+                <a16:creationId xmlns:a16="http://schemas.microsoft.com/office/drawing/2014/main" id="{FF66E140-42EA-4B89-A935-B8CF43F2D289}"/>
+              </a:ext>
+            </a:extLst>
+          </p:cNvPr>
+          <p:cNvCxnSpPr>
+            <a:cxnSpLocks/>
+            <a:endCxn id="6" idx="2"/>
+          </p:cNvCxnSpPr>
+          <p:nvPr/>
+        </p:nvCxnSpPr>
+        <p:spPr>
+          <a:xfrm flipH="1" flipV="1">
+            <a:off x="-732972" y="4457700"/>
+            <a:ext cx="1487716" cy="1435100"/>
+          </a:xfrm>
+          <a:prstGeom prst="straightConnector1">
+            <a:avLst/>
+          </a:prstGeom>
+          <a:ln>
+            <a:tailEnd type="triangle"/>
+          </a:ln>
+        </p:spPr>
+        <p:style>
+          <a:lnRef idx="3">
+            <a:schemeClr val="dk1"/>
+          </a:lnRef>
+          <a:fillRef idx="0">
+            <a:schemeClr val="dk1"/>
+          </a:fillRef>
+          <a:effectRef idx="2">
+            <a:schemeClr val="dk1"/>
+          </a:effectRef>
+          <a:fontRef idx="minor">
+            <a:schemeClr val="tx1"/>
+          </a:fontRef>
+        </p:style>
+      </p:cxnSp>
+      <p:cxnSp>
+        <p:nvCxnSpPr>
+          <p:cNvPr id="13" name="Straight Arrow Connector 12">
+            <a:extLst>
+              <a:ext uri="{FF2B5EF4-FFF2-40B4-BE49-F238E27FC236}">
+                <a16:creationId xmlns:a16="http://schemas.microsoft.com/office/drawing/2014/main" id="{A1E6CB57-14F2-4120-BA02-4BD5077D91AB}"/>
+              </a:ext>
+            </a:extLst>
+          </p:cNvPr>
+          <p:cNvCxnSpPr>
+            <a:cxnSpLocks/>
+            <a:endCxn id="7" idx="0"/>
+          </p:cNvCxnSpPr>
+          <p:nvPr/>
+        </p:nvCxnSpPr>
+        <p:spPr>
+          <a:xfrm flipH="1">
+            <a:off x="7617279" y="449943"/>
+            <a:ext cx="1657350" cy="997857"/>
+          </a:xfrm>
+          <a:prstGeom prst="straightConnector1">
+            <a:avLst/>
+          </a:prstGeom>
+          <a:ln>
+            <a:tailEnd type="triangle"/>
+          </a:ln>
+        </p:spPr>
+        <p:style>
+          <a:lnRef idx="3">
+            <a:schemeClr val="dk1"/>
+          </a:lnRef>
+          <a:fillRef idx="0">
+            <a:schemeClr val="dk1"/>
+          </a:fillRef>
+          <a:effectRef idx="2">
+            <a:schemeClr val="dk1"/>
+          </a:effectRef>
+          <a:fontRef idx="minor">
+            <a:schemeClr val="tx1"/>
+          </a:fontRef>
+        </p:style>
+      </p:cxnSp>
+      <p:sp>
+        <p:nvSpPr>
+          <p:cNvPr id="15" name="TextBox 14">
+            <a:extLst>
+              <a:ext uri="{FF2B5EF4-FFF2-40B4-BE49-F238E27FC236}">
+                <a16:creationId xmlns:a16="http://schemas.microsoft.com/office/drawing/2014/main" id="{C3BA7468-6C06-4796-A615-E33A8FE1DF3F}"/>
+              </a:ext>
+            </a:extLst>
+          </p:cNvPr>
+          <p:cNvSpPr txBox="1"/>
+          <p:nvPr/>
+        </p:nvSpPr>
+        <p:spPr>
+          <a:xfrm>
+            <a:off x="9274629" y="219311"/>
+            <a:ext cx="1473417" cy="369332"/>
+          </a:xfrm>
+          <a:prstGeom prst="rect">
+            <a:avLst/>
+          </a:prstGeom>
+          <a:noFill/>
+        </p:spPr>
+        <p:txBody>
+          <a:bodyPr wrap="none" rtlCol="0">
+            <a:spAutoFit/>
+          </a:bodyPr>
+          <a:lstStyle/>
+          <a:p>
+            <a:r>
+              <a:rPr lang="it-IT" dirty="0"/>
+              <a:t>New Features</a:t>
+            </a:r>
+            <a:endParaRPr lang="en-GB" dirty="0"/>
+          </a:p>
+        </p:txBody>
+      </p:sp>
+      <p:sp>
+        <p:nvSpPr>
+          <p:cNvPr id="16" name="TextBox 15">
+            <a:extLst>
+              <a:ext uri="{FF2B5EF4-FFF2-40B4-BE49-F238E27FC236}">
+                <a16:creationId xmlns:a16="http://schemas.microsoft.com/office/drawing/2014/main" id="{01F96025-66D7-49C5-A073-9A3A59D760CE}"/>
+              </a:ext>
+            </a:extLst>
+          </p:cNvPr>
+          <p:cNvSpPr txBox="1"/>
+          <p:nvPr/>
+        </p:nvSpPr>
+        <p:spPr>
+          <a:xfrm>
+            <a:off x="754743" y="5708134"/>
+            <a:ext cx="1598323" cy="369332"/>
+          </a:xfrm>
+          <a:prstGeom prst="rect">
+            <a:avLst/>
+          </a:prstGeom>
+          <a:noFill/>
+        </p:spPr>
+        <p:txBody>
+          <a:bodyPr wrap="none" rtlCol="0">
+            <a:spAutoFit/>
+          </a:bodyPr>
+          <a:lstStyle/>
+          <a:p>
+            <a:r>
+              <a:rPr lang="it-IT" dirty="0" err="1"/>
+              <a:t>Initial</a:t>
+            </a:r>
+            <a:r>
+              <a:rPr lang="it-IT" dirty="0"/>
+              <a:t> </a:t>
+            </a:r>
+            <a:r>
+              <a:rPr lang="it-IT" dirty="0" err="1"/>
+              <a:t>variables</a:t>
+            </a:r>
+            <a:endParaRPr lang="en-GB" dirty="0"/>
+          </a:p>
+        </p:txBody>
+      </p:sp>
+    </p:spTree>
+    <p:extLst>
+      <p:ext uri="{BB962C8B-B14F-4D97-AF65-F5344CB8AC3E}">
+        <p14:creationId xmlns:p14="http://schemas.microsoft.com/office/powerpoint/2010/main" val="2629657286"/>
+      </p:ext>
+    </p:extLst>
+  </p:cSld>
+  <p:clrMapOvr>
+    <a:masterClrMapping/>
+  </p:clrMapOvr>
+</p:sld>
+</file>
+
 <file path=ppt/theme/theme1.xml><?xml version="1.0" encoding="utf-8"?>
 <a:theme xmlns:a="http://schemas.openxmlformats.org/drawingml/2006/main" name="Office Theme">
   <a:themeElements>

</xml_diff>

<commit_message>
upd data step func
</commit_message>
<xml_diff>
--- a/screenshots/imgs.pptx
+++ b/screenshots/imgs.pptx
@@ -13,6 +13,8 @@
     <p:sldId id="261" r:id="rId7"/>
     <p:sldId id="262" r:id="rId8"/>
     <p:sldId id="263" r:id="rId9"/>
+    <p:sldId id="264" r:id="rId10"/>
+    <p:sldId id="265" r:id="rId11"/>
   </p:sldIdLst>
   <p:sldSz cx="12192000" cy="6858000"/>
   <p:notesSz cx="6858000" cy="9144000"/>
@@ -268,7 +270,7 @@
           <a:p>
             <a:fld id="{166DC043-4AEC-4A4E-AB79-0D54B7828DD9}" type="datetimeFigureOut">
               <a:rPr lang="en-GB" smtClean="0"/>
-              <a:t>03/05/2021</a:t>
+              <a:t>04/05/2021</a:t>
             </a:fld>
             <a:endParaRPr lang="en-GB"/>
           </a:p>
@@ -468,7 +470,7 @@
           <a:p>
             <a:fld id="{166DC043-4AEC-4A4E-AB79-0D54B7828DD9}" type="datetimeFigureOut">
               <a:rPr lang="en-GB" smtClean="0"/>
-              <a:t>03/05/2021</a:t>
+              <a:t>04/05/2021</a:t>
             </a:fld>
             <a:endParaRPr lang="en-GB"/>
           </a:p>
@@ -678,7 +680,7 @@
           <a:p>
             <a:fld id="{166DC043-4AEC-4A4E-AB79-0D54B7828DD9}" type="datetimeFigureOut">
               <a:rPr lang="en-GB" smtClean="0"/>
-              <a:t>03/05/2021</a:t>
+              <a:t>04/05/2021</a:t>
             </a:fld>
             <a:endParaRPr lang="en-GB"/>
           </a:p>
@@ -878,7 +880,7 @@
           <a:p>
             <a:fld id="{166DC043-4AEC-4A4E-AB79-0D54B7828DD9}" type="datetimeFigureOut">
               <a:rPr lang="en-GB" smtClean="0"/>
-              <a:t>03/05/2021</a:t>
+              <a:t>04/05/2021</a:t>
             </a:fld>
             <a:endParaRPr lang="en-GB"/>
           </a:p>
@@ -1154,7 +1156,7 @@
           <a:p>
             <a:fld id="{166DC043-4AEC-4A4E-AB79-0D54B7828DD9}" type="datetimeFigureOut">
               <a:rPr lang="en-GB" smtClean="0"/>
-              <a:t>03/05/2021</a:t>
+              <a:t>04/05/2021</a:t>
             </a:fld>
             <a:endParaRPr lang="en-GB"/>
           </a:p>
@@ -1422,7 +1424,7 @@
           <a:p>
             <a:fld id="{166DC043-4AEC-4A4E-AB79-0D54B7828DD9}" type="datetimeFigureOut">
               <a:rPr lang="en-GB" smtClean="0"/>
-              <a:t>03/05/2021</a:t>
+              <a:t>04/05/2021</a:t>
             </a:fld>
             <a:endParaRPr lang="en-GB"/>
           </a:p>
@@ -1837,7 +1839,7 @@
           <a:p>
             <a:fld id="{166DC043-4AEC-4A4E-AB79-0D54B7828DD9}" type="datetimeFigureOut">
               <a:rPr lang="en-GB" smtClean="0"/>
-              <a:t>03/05/2021</a:t>
+              <a:t>04/05/2021</a:t>
             </a:fld>
             <a:endParaRPr lang="en-GB"/>
           </a:p>
@@ -1979,7 +1981,7 @@
           <a:p>
             <a:fld id="{166DC043-4AEC-4A4E-AB79-0D54B7828DD9}" type="datetimeFigureOut">
               <a:rPr lang="en-GB" smtClean="0"/>
-              <a:t>03/05/2021</a:t>
+              <a:t>04/05/2021</a:t>
             </a:fld>
             <a:endParaRPr lang="en-GB"/>
           </a:p>
@@ -2092,7 +2094,7 @@
           <a:p>
             <a:fld id="{166DC043-4AEC-4A4E-AB79-0D54B7828DD9}" type="datetimeFigureOut">
               <a:rPr lang="en-GB" smtClean="0"/>
-              <a:t>03/05/2021</a:t>
+              <a:t>04/05/2021</a:t>
             </a:fld>
             <a:endParaRPr lang="en-GB"/>
           </a:p>
@@ -2405,7 +2407,7 @@
           <a:p>
             <a:fld id="{166DC043-4AEC-4A4E-AB79-0D54B7828DD9}" type="datetimeFigureOut">
               <a:rPr lang="en-GB" smtClean="0"/>
-              <a:t>03/05/2021</a:t>
+              <a:t>04/05/2021</a:t>
             </a:fld>
             <a:endParaRPr lang="en-GB"/>
           </a:p>
@@ -2694,7 +2696,7 @@
           <a:p>
             <a:fld id="{166DC043-4AEC-4A4E-AB79-0D54B7828DD9}" type="datetimeFigureOut">
               <a:rPr lang="en-GB" smtClean="0"/>
-              <a:t>03/05/2021</a:t>
+              <a:t>04/05/2021</a:t>
             </a:fld>
             <a:endParaRPr lang="en-GB"/>
           </a:p>
@@ -2937,7 +2939,7 @@
           <a:p>
             <a:fld id="{166DC043-4AEC-4A4E-AB79-0D54B7828DD9}" type="datetimeFigureOut">
               <a:rPr lang="en-GB" smtClean="0"/>
-              <a:t>03/05/2021</a:t>
+              <a:t>04/05/2021</a:t>
             </a:fld>
             <a:endParaRPr lang="en-GB"/>
           </a:p>
@@ -3959,6 +3961,603 @@
 </p:sld>
 </file>
 
+<file path=ppt/slides/slide10.xml><?xml version="1.0" encoding="utf-8"?>
+<p:sld xmlns:a="http://schemas.openxmlformats.org/drawingml/2006/main" xmlns:r="http://schemas.openxmlformats.org/officeDocument/2006/relationships" xmlns:p="http://schemas.openxmlformats.org/presentationml/2006/main">
+  <p:cSld>
+    <p:spTree>
+      <p:nvGrpSpPr>
+        <p:cNvPr id="1" name=""/>
+        <p:cNvGrpSpPr/>
+        <p:nvPr/>
+      </p:nvGrpSpPr>
+      <p:grpSpPr>
+        <a:xfrm>
+          <a:off x="0" y="0"/>
+          <a:ext cx="0" cy="0"/>
+          <a:chOff x="0" y="0"/>
+          <a:chExt cx="0" cy="0"/>
+        </a:xfrm>
+      </p:grpSpPr>
+      <p:pic>
+        <p:nvPicPr>
+          <p:cNvPr id="5" name="Picture 4" descr="Table&#10;&#10;Description automatically generated">
+            <a:extLst>
+              <a:ext uri="{FF2B5EF4-FFF2-40B4-BE49-F238E27FC236}">
+                <a16:creationId xmlns:a16="http://schemas.microsoft.com/office/drawing/2014/main" id="{0F4BA83B-0941-451C-B6B1-C7355197BB62}"/>
+              </a:ext>
+            </a:extLst>
+          </p:cNvPr>
+          <p:cNvPicPr>
+            <a:picLocks noChangeAspect="1"/>
+          </p:cNvPicPr>
+          <p:nvPr/>
+        </p:nvPicPr>
+        <p:blipFill>
+          <a:blip r:embed="rId2">
+            <a:extLst>
+              <a:ext uri="{28A0092B-C50C-407E-A947-70E740481C1C}">
+                <a14:useLocalDpi xmlns:a14="http://schemas.microsoft.com/office/drawing/2010/main" val="0"/>
+              </a:ext>
+            </a:extLst>
+          </a:blip>
+          <a:stretch>
+            <a:fillRect/>
+          </a:stretch>
+        </p:blipFill>
+        <p:spPr>
+          <a:xfrm>
+            <a:off x="-3139052" y="1432362"/>
+            <a:ext cx="17754756" cy="2712144"/>
+          </a:xfrm>
+          <a:prstGeom prst="rect">
+            <a:avLst/>
+          </a:prstGeom>
+        </p:spPr>
+      </p:pic>
+      <p:sp>
+        <p:nvSpPr>
+          <p:cNvPr id="6" name="Rectangle 5">
+            <a:extLst>
+              <a:ext uri="{FF2B5EF4-FFF2-40B4-BE49-F238E27FC236}">
+                <a16:creationId xmlns:a16="http://schemas.microsoft.com/office/drawing/2014/main" id="{5C0EB8F5-1A51-4CF8-95F7-25199AEE3878}"/>
+              </a:ext>
+            </a:extLst>
+          </p:cNvPr>
+          <p:cNvSpPr/>
+          <p:nvPr/>
+        </p:nvSpPr>
+        <p:spPr>
+          <a:xfrm>
+            <a:off x="-2550695" y="1588168"/>
+            <a:ext cx="3497179" cy="2438399"/>
+          </a:xfrm>
+          <a:prstGeom prst="rect">
+            <a:avLst/>
+          </a:prstGeom>
+          <a:solidFill>
+            <a:schemeClr val="accent3">
+              <a:alpha val="80000"/>
+            </a:schemeClr>
+          </a:solidFill>
+          <a:ln>
+            <a:noFill/>
+          </a:ln>
+        </p:spPr>
+        <p:style>
+          <a:lnRef idx="0">
+            <a:scrgbClr r="0" g="0" b="0"/>
+          </a:lnRef>
+          <a:fillRef idx="0">
+            <a:scrgbClr r="0" g="0" b="0"/>
+          </a:fillRef>
+          <a:effectRef idx="0">
+            <a:scrgbClr r="0" g="0" b="0"/>
+          </a:effectRef>
+          <a:fontRef idx="minor">
+            <a:schemeClr val="lt1"/>
+          </a:fontRef>
+        </p:style>
+        <p:txBody>
+          <a:bodyPr rtlCol="0" anchor="ctr"/>
+          <a:lstStyle/>
+          <a:p>
+            <a:pPr algn="ctr"/>
+            <a:endParaRPr lang="en-GB"/>
+          </a:p>
+        </p:txBody>
+      </p:sp>
+      <p:sp>
+        <p:nvSpPr>
+          <p:cNvPr id="7" name="Rectangle 6">
+            <a:extLst>
+              <a:ext uri="{FF2B5EF4-FFF2-40B4-BE49-F238E27FC236}">
+                <a16:creationId xmlns:a16="http://schemas.microsoft.com/office/drawing/2014/main" id="{68FE683A-8023-40D4-95DE-59E77DF20CDC}"/>
+              </a:ext>
+            </a:extLst>
+          </p:cNvPr>
+          <p:cNvSpPr/>
+          <p:nvPr/>
+        </p:nvSpPr>
+        <p:spPr>
+          <a:xfrm>
+            <a:off x="1804737" y="1588167"/>
+            <a:ext cx="11558337" cy="2438399"/>
+          </a:xfrm>
+          <a:prstGeom prst="rect">
+            <a:avLst/>
+          </a:prstGeom>
+          <a:solidFill>
+            <a:schemeClr val="accent3">
+              <a:alpha val="80000"/>
+            </a:schemeClr>
+          </a:solidFill>
+          <a:ln>
+            <a:noFill/>
+          </a:ln>
+        </p:spPr>
+        <p:style>
+          <a:lnRef idx="0">
+            <a:scrgbClr r="0" g="0" b="0"/>
+          </a:lnRef>
+          <a:fillRef idx="0">
+            <a:scrgbClr r="0" g="0" b="0"/>
+          </a:fillRef>
+          <a:effectRef idx="0">
+            <a:scrgbClr r="0" g="0" b="0"/>
+          </a:effectRef>
+          <a:fontRef idx="minor">
+            <a:schemeClr val="lt1"/>
+          </a:fontRef>
+        </p:style>
+        <p:txBody>
+          <a:bodyPr rtlCol="0" anchor="ctr"/>
+          <a:lstStyle/>
+          <a:p>
+            <a:pPr algn="ctr"/>
+            <a:endParaRPr lang="en-GB"/>
+          </a:p>
+        </p:txBody>
+      </p:sp>
+      <p:sp>
+        <p:nvSpPr>
+          <p:cNvPr id="8" name="Rectangle 7">
+            <a:extLst>
+              <a:ext uri="{FF2B5EF4-FFF2-40B4-BE49-F238E27FC236}">
+                <a16:creationId xmlns:a16="http://schemas.microsoft.com/office/drawing/2014/main" id="{87FC72FB-313B-4E06-B93E-4DEA8BE570F2}"/>
+              </a:ext>
+            </a:extLst>
+          </p:cNvPr>
+          <p:cNvSpPr/>
+          <p:nvPr/>
+        </p:nvSpPr>
+        <p:spPr>
+          <a:xfrm>
+            <a:off x="946484" y="1796716"/>
+            <a:ext cx="858253" cy="2229850"/>
+          </a:xfrm>
+          <a:prstGeom prst="rect">
+            <a:avLst/>
+          </a:prstGeom>
+          <a:noFill/>
+          <a:ln w="9525" cap="flat" cmpd="sng" algn="ctr">
+            <a:solidFill>
+              <a:schemeClr val="accent2"/>
+            </a:solidFill>
+            <a:prstDash val="solid"/>
+            <a:round/>
+            <a:headEnd type="none" w="med" len="med"/>
+            <a:tailEnd type="none" w="med" len="med"/>
+          </a:ln>
+        </p:spPr>
+        <p:style>
+          <a:lnRef idx="0">
+            <a:scrgbClr r="0" g="0" b="0"/>
+          </a:lnRef>
+          <a:fillRef idx="0">
+            <a:scrgbClr r="0" g="0" b="0"/>
+          </a:fillRef>
+          <a:effectRef idx="0">
+            <a:scrgbClr r="0" g="0" b="0"/>
+          </a:effectRef>
+          <a:fontRef idx="minor">
+            <a:schemeClr val="accent2"/>
+          </a:fontRef>
+        </p:style>
+        <p:txBody>
+          <a:bodyPr rtlCol="0" anchor="ctr"/>
+          <a:lstStyle/>
+          <a:p>
+            <a:pPr algn="ctr"/>
+            <a:endParaRPr lang="en-GB"/>
+          </a:p>
+        </p:txBody>
+      </p:sp>
+      <p:sp>
+        <p:nvSpPr>
+          <p:cNvPr id="9" name="Rectangle 8">
+            <a:extLst>
+              <a:ext uri="{FF2B5EF4-FFF2-40B4-BE49-F238E27FC236}">
+                <a16:creationId xmlns:a16="http://schemas.microsoft.com/office/drawing/2014/main" id="{4569E55D-0C21-4452-91D4-6E3D3ED46573}"/>
+              </a:ext>
+            </a:extLst>
+          </p:cNvPr>
+          <p:cNvSpPr/>
+          <p:nvPr/>
+        </p:nvSpPr>
+        <p:spPr>
+          <a:xfrm>
+            <a:off x="946484" y="1796715"/>
+            <a:ext cx="465221" cy="240632"/>
+          </a:xfrm>
+          <a:prstGeom prst="rect">
+            <a:avLst/>
+          </a:prstGeom>
+          <a:noFill/>
+          <a:ln w="22225" cap="flat" cmpd="sng" algn="ctr">
+            <a:solidFill>
+              <a:schemeClr val="accent4"/>
+            </a:solidFill>
+            <a:prstDash val="solid"/>
+            <a:round/>
+            <a:headEnd type="none" w="med" len="med"/>
+            <a:tailEnd type="none" w="med" len="med"/>
+          </a:ln>
+        </p:spPr>
+        <p:style>
+          <a:lnRef idx="0">
+            <a:scrgbClr r="0" g="0" b="0"/>
+          </a:lnRef>
+          <a:fillRef idx="0">
+            <a:scrgbClr r="0" g="0" b="0"/>
+          </a:fillRef>
+          <a:effectRef idx="0">
+            <a:scrgbClr r="0" g="0" b="0"/>
+          </a:effectRef>
+          <a:fontRef idx="minor">
+            <a:schemeClr val="accent4"/>
+          </a:fontRef>
+        </p:style>
+        <p:txBody>
+          <a:bodyPr rtlCol="0" anchor="ctr"/>
+          <a:lstStyle/>
+          <a:p>
+            <a:pPr algn="ctr"/>
+            <a:endParaRPr lang="en-GB"/>
+          </a:p>
+        </p:txBody>
+      </p:sp>
+      <p:cxnSp>
+        <p:nvCxnSpPr>
+          <p:cNvPr id="13" name="Straight Arrow Connector 12">
+            <a:extLst>
+              <a:ext uri="{FF2B5EF4-FFF2-40B4-BE49-F238E27FC236}">
+                <a16:creationId xmlns:a16="http://schemas.microsoft.com/office/drawing/2014/main" id="{DF9B9ACA-C0A3-4031-B4D0-571DC06B11C7}"/>
+              </a:ext>
+            </a:extLst>
+          </p:cNvPr>
+          <p:cNvCxnSpPr>
+            <a:stCxn id="9" idx="3"/>
+          </p:cNvCxnSpPr>
+          <p:nvPr/>
+        </p:nvCxnSpPr>
+        <p:spPr>
+          <a:xfrm flipV="1">
+            <a:off x="1411705" y="1909011"/>
+            <a:ext cx="11951369" cy="8020"/>
+          </a:xfrm>
+          <a:prstGeom prst="straightConnector1">
+            <a:avLst/>
+          </a:prstGeom>
+          <a:ln>
+            <a:tailEnd type="triangle"/>
+          </a:ln>
+        </p:spPr>
+        <p:style>
+          <a:lnRef idx="2">
+            <a:schemeClr val="dk1"/>
+          </a:lnRef>
+          <a:fillRef idx="0">
+            <a:schemeClr val="dk1"/>
+          </a:fillRef>
+          <a:effectRef idx="1">
+            <a:schemeClr val="dk1"/>
+          </a:effectRef>
+          <a:fontRef idx="minor">
+            <a:schemeClr val="tx1"/>
+          </a:fontRef>
+        </p:style>
+      </p:cxnSp>
+      <p:sp>
+        <p:nvSpPr>
+          <p:cNvPr id="14" name="Oval 13">
+            <a:extLst>
+              <a:ext uri="{FF2B5EF4-FFF2-40B4-BE49-F238E27FC236}">
+                <a16:creationId xmlns:a16="http://schemas.microsoft.com/office/drawing/2014/main" id="{49178D9A-287D-4987-8527-CA584098FB61}"/>
+              </a:ext>
+            </a:extLst>
+          </p:cNvPr>
+          <p:cNvSpPr/>
+          <p:nvPr/>
+        </p:nvSpPr>
+        <p:spPr>
+          <a:xfrm>
+            <a:off x="13363073" y="1796715"/>
+            <a:ext cx="1074821" cy="240632"/>
+          </a:xfrm>
+          <a:prstGeom prst="ellipse">
+            <a:avLst/>
+          </a:prstGeom>
+          <a:noFill/>
+          <a:ln w="9525" cap="flat" cmpd="sng" algn="ctr">
+            <a:solidFill>
+              <a:schemeClr val="accent2"/>
+            </a:solidFill>
+            <a:prstDash val="solid"/>
+            <a:round/>
+            <a:headEnd type="none" w="med" len="med"/>
+            <a:tailEnd type="none" w="med" len="med"/>
+          </a:ln>
+        </p:spPr>
+        <p:style>
+          <a:lnRef idx="0">
+            <a:scrgbClr r="0" g="0" b="0"/>
+          </a:lnRef>
+          <a:fillRef idx="0">
+            <a:scrgbClr r="0" g="0" b="0"/>
+          </a:fillRef>
+          <a:effectRef idx="0">
+            <a:scrgbClr r="0" g="0" b="0"/>
+          </a:effectRef>
+          <a:fontRef idx="minor">
+            <a:schemeClr val="accent2"/>
+          </a:fontRef>
+        </p:style>
+        <p:txBody>
+          <a:bodyPr rtlCol="0" anchor="ctr"/>
+          <a:lstStyle/>
+          <a:p>
+            <a:pPr algn="ctr"/>
+            <a:endParaRPr lang="en-GB"/>
+          </a:p>
+        </p:txBody>
+      </p:sp>
+      <p:sp>
+        <p:nvSpPr>
+          <p:cNvPr id="15" name="Oval 14">
+            <a:extLst>
+              <a:ext uri="{FF2B5EF4-FFF2-40B4-BE49-F238E27FC236}">
+                <a16:creationId xmlns:a16="http://schemas.microsoft.com/office/drawing/2014/main" id="{B8A823BB-CD93-4E33-8756-70260082CD88}"/>
+              </a:ext>
+            </a:extLst>
+          </p:cNvPr>
+          <p:cNvSpPr/>
+          <p:nvPr/>
+        </p:nvSpPr>
+        <p:spPr>
+          <a:xfrm>
+            <a:off x="13783992" y="1788232"/>
+            <a:ext cx="653902" cy="240632"/>
+          </a:xfrm>
+          <a:prstGeom prst="ellipse">
+            <a:avLst/>
+          </a:prstGeom>
+          <a:solidFill>
+            <a:schemeClr val="accent2">
+              <a:alpha val="50000"/>
+            </a:schemeClr>
+          </a:solidFill>
+          <a:ln>
+            <a:solidFill>
+              <a:schemeClr val="accent2">
+                <a:lumMod val="50000"/>
+              </a:schemeClr>
+            </a:solidFill>
+          </a:ln>
+        </p:spPr>
+        <p:style>
+          <a:lnRef idx="0">
+            <a:scrgbClr r="0" g="0" b="0"/>
+          </a:lnRef>
+          <a:fillRef idx="0">
+            <a:scrgbClr r="0" g="0" b="0"/>
+          </a:fillRef>
+          <a:effectRef idx="0">
+            <a:scrgbClr r="0" g="0" b="0"/>
+          </a:effectRef>
+          <a:fontRef idx="minor">
+            <a:schemeClr val="lt1"/>
+          </a:fontRef>
+        </p:style>
+        <p:txBody>
+          <a:bodyPr rtlCol="0" anchor="ctr"/>
+          <a:lstStyle/>
+          <a:p>
+            <a:pPr algn="ctr"/>
+            <a:endParaRPr lang="en-GB"/>
+          </a:p>
+        </p:txBody>
+      </p:sp>
+      <p:sp>
+        <p:nvSpPr>
+          <p:cNvPr id="18" name="TextBox 17">
+            <a:extLst>
+              <a:ext uri="{FF2B5EF4-FFF2-40B4-BE49-F238E27FC236}">
+                <a16:creationId xmlns:a16="http://schemas.microsoft.com/office/drawing/2014/main" id="{5F7D0ACC-C74F-41BE-A4BE-6E3399CEB529}"/>
+              </a:ext>
+            </a:extLst>
+          </p:cNvPr>
+          <p:cNvSpPr txBox="1"/>
+          <p:nvPr/>
+        </p:nvSpPr>
+        <p:spPr>
+          <a:xfrm>
+            <a:off x="11691140" y="822216"/>
+            <a:ext cx="1671933" cy="369332"/>
+          </a:xfrm>
+          <a:prstGeom prst="rect">
+            <a:avLst/>
+          </a:prstGeom>
+          <a:noFill/>
+        </p:spPr>
+        <p:txBody>
+          <a:bodyPr wrap="none" rtlCol="0">
+            <a:spAutoFit/>
+          </a:bodyPr>
+          <a:lstStyle/>
+          <a:p>
+            <a:r>
+              <a:rPr lang="it-IT" dirty="0" err="1"/>
+              <a:t>substr</a:t>
+            </a:r>
+            <a:r>
+              <a:rPr lang="it-IT" dirty="0"/>
+              <a:t>(date,1,5)</a:t>
+            </a:r>
+            <a:endParaRPr lang="en-GB" dirty="0"/>
+          </a:p>
+        </p:txBody>
+      </p:sp>
+      <p:cxnSp>
+        <p:nvCxnSpPr>
+          <p:cNvPr id="20" name="Straight Arrow Connector 19">
+            <a:extLst>
+              <a:ext uri="{FF2B5EF4-FFF2-40B4-BE49-F238E27FC236}">
+                <a16:creationId xmlns:a16="http://schemas.microsoft.com/office/drawing/2014/main" id="{567507BF-6198-4B08-ADA2-D7EE80E9C797}"/>
+              </a:ext>
+            </a:extLst>
+          </p:cNvPr>
+          <p:cNvCxnSpPr>
+            <a:stCxn id="18" idx="2"/>
+            <a:endCxn id="14" idx="1"/>
+          </p:cNvCxnSpPr>
+          <p:nvPr/>
+        </p:nvCxnSpPr>
+        <p:spPr>
+          <a:xfrm>
+            <a:off x="12527107" y="1191548"/>
+            <a:ext cx="993370" cy="640407"/>
+          </a:xfrm>
+          <a:prstGeom prst="straightConnector1">
+            <a:avLst/>
+          </a:prstGeom>
+          <a:ln>
+            <a:tailEnd type="triangle"/>
+          </a:ln>
+        </p:spPr>
+        <p:style>
+          <a:lnRef idx="3">
+            <a:schemeClr val="dk1"/>
+          </a:lnRef>
+          <a:fillRef idx="0">
+            <a:schemeClr val="dk1"/>
+          </a:fillRef>
+          <a:effectRef idx="2">
+            <a:schemeClr val="dk1"/>
+          </a:effectRef>
+          <a:fontRef idx="minor">
+            <a:schemeClr val="tx1"/>
+          </a:fontRef>
+        </p:style>
+      </p:cxnSp>
+      <p:sp>
+        <p:nvSpPr>
+          <p:cNvPr id="24" name="TextBox 23">
+            <a:extLst>
+              <a:ext uri="{FF2B5EF4-FFF2-40B4-BE49-F238E27FC236}">
+                <a16:creationId xmlns:a16="http://schemas.microsoft.com/office/drawing/2014/main" id="{FA56B8FF-75A7-433F-9278-F80BAA0C19D4}"/>
+              </a:ext>
+            </a:extLst>
+          </p:cNvPr>
+          <p:cNvSpPr txBox="1"/>
+          <p:nvPr/>
+        </p:nvSpPr>
+        <p:spPr>
+          <a:xfrm>
+            <a:off x="14110943" y="822216"/>
+            <a:ext cx="1421351" cy="369332"/>
+          </a:xfrm>
+          <a:prstGeom prst="rect">
+            <a:avLst/>
+          </a:prstGeom>
+          <a:noFill/>
+        </p:spPr>
+        <p:txBody>
+          <a:bodyPr wrap="none" rtlCol="0">
+            <a:spAutoFit/>
+          </a:bodyPr>
+          <a:lstStyle/>
+          <a:p>
+            <a:r>
+              <a:rPr lang="it-IT" dirty="0"/>
+              <a:t>|| ‘</a:t>
+            </a:r>
+            <a:r>
+              <a:rPr lang="it-IT" dirty="0" err="1"/>
+              <a:t>dd</a:t>
+            </a:r>
+            <a:r>
+              <a:rPr lang="it-IT" dirty="0"/>
+              <a:t>-mmm’</a:t>
+            </a:r>
+            <a:endParaRPr lang="en-GB" dirty="0"/>
+          </a:p>
+        </p:txBody>
+      </p:sp>
+      <p:cxnSp>
+        <p:nvCxnSpPr>
+          <p:cNvPr id="26" name="Straight Arrow Connector 25">
+            <a:extLst>
+              <a:ext uri="{FF2B5EF4-FFF2-40B4-BE49-F238E27FC236}">
+                <a16:creationId xmlns:a16="http://schemas.microsoft.com/office/drawing/2014/main" id="{BC0012CC-9AC3-4C8E-BAC4-6BAF80ACBB50}"/>
+              </a:ext>
+            </a:extLst>
+          </p:cNvPr>
+          <p:cNvCxnSpPr>
+            <a:stCxn id="24" idx="2"/>
+            <a:endCxn id="15" idx="7"/>
+          </p:cNvCxnSpPr>
+          <p:nvPr/>
+        </p:nvCxnSpPr>
+        <p:spPr>
+          <a:xfrm flipH="1">
+            <a:off x="14342132" y="1191548"/>
+            <a:ext cx="479487" cy="631924"/>
+          </a:xfrm>
+          <a:prstGeom prst="straightConnector1">
+            <a:avLst/>
+          </a:prstGeom>
+          <a:ln>
+            <a:tailEnd type="triangle"/>
+          </a:ln>
+        </p:spPr>
+        <p:style>
+          <a:lnRef idx="3">
+            <a:schemeClr val="dk1"/>
+          </a:lnRef>
+          <a:fillRef idx="0">
+            <a:schemeClr val="dk1"/>
+          </a:fillRef>
+          <a:effectRef idx="2">
+            <a:schemeClr val="dk1"/>
+          </a:effectRef>
+          <a:fontRef idx="minor">
+            <a:schemeClr val="tx1"/>
+          </a:fontRef>
+        </p:style>
+      </p:cxnSp>
+    </p:spTree>
+    <p:extLst>
+      <p:ext uri="{BB962C8B-B14F-4D97-AF65-F5344CB8AC3E}">
+        <p14:creationId xmlns:p14="http://schemas.microsoft.com/office/powerpoint/2010/main" val="71266230"/>
+      </p:ext>
+    </p:extLst>
+  </p:cSld>
+  <p:clrMapOvr>
+    <a:masterClrMapping/>
+  </p:clrMapOvr>
+</p:sld>
+</file>
+
 <file path=ppt/slides/slide2.xml><?xml version="1.0" encoding="utf-8"?>
 <p:sld xmlns:a="http://schemas.openxmlformats.org/drawingml/2006/main" xmlns:r="http://schemas.openxmlformats.org/officeDocument/2006/relationships" xmlns:p="http://schemas.openxmlformats.org/presentationml/2006/main">
   <p:cSld>
@@ -7099,7 +7698,7 @@
         </p:nvSpPr>
         <p:spPr>
           <a:xfrm>
-            <a:off x="2571516" y="1590951"/>
+            <a:off x="2521412" y="1590951"/>
             <a:ext cx="389850" cy="584775"/>
           </a:xfrm>
           <a:prstGeom prst="rect">
@@ -7467,6 +8066,675 @@
     <p:extLst>
       <p:ext uri="{BB962C8B-B14F-4D97-AF65-F5344CB8AC3E}">
         <p14:creationId xmlns:p14="http://schemas.microsoft.com/office/powerpoint/2010/main" val="3627530732"/>
+      </p:ext>
+    </p:extLst>
+  </p:cSld>
+  <p:clrMapOvr>
+    <a:masterClrMapping/>
+  </p:clrMapOvr>
+</p:sld>
+</file>
+
+<file path=ppt/slides/slide9.xml><?xml version="1.0" encoding="utf-8"?>
+<p:sld xmlns:a="http://schemas.openxmlformats.org/drawingml/2006/main" xmlns:r="http://schemas.openxmlformats.org/officeDocument/2006/relationships" xmlns:p="http://schemas.openxmlformats.org/presentationml/2006/main">
+  <p:cSld>
+    <p:bg>
+      <p:bgPr>
+        <a:solidFill>
+          <a:schemeClr val="bg1"/>
+        </a:solidFill>
+        <a:effectLst/>
+      </p:bgPr>
+    </p:bg>
+    <p:spTree>
+      <p:nvGrpSpPr>
+        <p:cNvPr id="1" name=""/>
+        <p:cNvGrpSpPr/>
+        <p:nvPr/>
+      </p:nvGrpSpPr>
+      <p:grpSpPr>
+        <a:xfrm>
+          <a:off x="0" y="0"/>
+          <a:ext cx="0" cy="0"/>
+          <a:chOff x="0" y="0"/>
+          <a:chExt cx="0" cy="0"/>
+        </a:xfrm>
+      </p:grpSpPr>
+      <p:pic>
+        <p:nvPicPr>
+          <p:cNvPr id="9" name="Picture 8" descr="Table&#10;&#10;Description automatically generated with medium confidence">
+            <a:extLst>
+              <a:ext uri="{FF2B5EF4-FFF2-40B4-BE49-F238E27FC236}">
+                <a16:creationId xmlns:a16="http://schemas.microsoft.com/office/drawing/2014/main" id="{0C4680B9-5ED2-4952-BC39-79E40F842CCD}"/>
+              </a:ext>
+            </a:extLst>
+          </p:cNvPr>
+          <p:cNvPicPr>
+            <a:picLocks noChangeAspect="1"/>
+          </p:cNvPicPr>
+          <p:nvPr/>
+        </p:nvPicPr>
+        <p:blipFill>
+          <a:blip r:embed="rId2">
+            <a:extLst>
+              <a:ext uri="{28A0092B-C50C-407E-A947-70E740481C1C}">
+                <a14:useLocalDpi xmlns:a14="http://schemas.microsoft.com/office/drawing/2010/main" val="0"/>
+              </a:ext>
+            </a:extLst>
+          </a:blip>
+          <a:stretch>
+            <a:fillRect/>
+          </a:stretch>
+        </p:blipFill>
+        <p:spPr>
+          <a:xfrm>
+            <a:off x="-4105295" y="1122947"/>
+            <a:ext cx="19209498" cy="3445438"/>
+          </a:xfrm>
+          <a:prstGeom prst="rect">
+            <a:avLst/>
+          </a:prstGeom>
+        </p:spPr>
+      </p:pic>
+      <p:sp>
+        <p:nvSpPr>
+          <p:cNvPr id="19" name="Rectangle 18">
+            <a:extLst>
+              <a:ext uri="{FF2B5EF4-FFF2-40B4-BE49-F238E27FC236}">
+                <a16:creationId xmlns:a16="http://schemas.microsoft.com/office/drawing/2014/main" id="{E9455D97-F609-48AC-9216-771CF9FA9F0C}"/>
+              </a:ext>
+            </a:extLst>
+          </p:cNvPr>
+          <p:cNvSpPr/>
+          <p:nvPr/>
+        </p:nvSpPr>
+        <p:spPr>
+          <a:xfrm>
+            <a:off x="-2558715" y="1540042"/>
+            <a:ext cx="3200399" cy="2518611"/>
+          </a:xfrm>
+          <a:prstGeom prst="rect">
+            <a:avLst/>
+          </a:prstGeom>
+          <a:solidFill>
+            <a:schemeClr val="accent2">
+              <a:alpha val="50000"/>
+            </a:schemeClr>
+          </a:solidFill>
+          <a:ln>
+            <a:noFill/>
+          </a:ln>
+        </p:spPr>
+        <p:style>
+          <a:lnRef idx="0">
+            <a:scrgbClr r="0" g="0" b="0"/>
+          </a:lnRef>
+          <a:fillRef idx="0">
+            <a:scrgbClr r="0" g="0" b="0"/>
+          </a:fillRef>
+          <a:effectRef idx="0">
+            <a:scrgbClr r="0" g="0" b="0"/>
+          </a:effectRef>
+          <a:fontRef idx="minor">
+            <a:schemeClr val="lt1"/>
+          </a:fontRef>
+        </p:style>
+        <p:txBody>
+          <a:bodyPr rtlCol="0" anchor="ctr"/>
+          <a:lstStyle/>
+          <a:p>
+            <a:pPr algn="ctr"/>
+            <a:endParaRPr lang="en-GB"/>
+          </a:p>
+        </p:txBody>
+      </p:sp>
+      <p:sp>
+        <p:nvSpPr>
+          <p:cNvPr id="10" name="Rectangle 9">
+            <a:extLst>
+              <a:ext uri="{FF2B5EF4-FFF2-40B4-BE49-F238E27FC236}">
+                <a16:creationId xmlns:a16="http://schemas.microsoft.com/office/drawing/2014/main" id="{F8E205C2-F0A5-4655-B9A2-FEEB5C5A6425}"/>
+              </a:ext>
+            </a:extLst>
+          </p:cNvPr>
+          <p:cNvSpPr/>
+          <p:nvPr/>
+        </p:nvSpPr>
+        <p:spPr>
+          <a:xfrm>
+            <a:off x="641684" y="1299411"/>
+            <a:ext cx="8678779" cy="2759242"/>
+          </a:xfrm>
+          <a:prstGeom prst="rect">
+            <a:avLst/>
+          </a:prstGeom>
+          <a:solidFill>
+            <a:schemeClr val="accent3">
+              <a:alpha val="80000"/>
+            </a:schemeClr>
+          </a:solidFill>
+          <a:ln>
+            <a:noFill/>
+          </a:ln>
+        </p:spPr>
+        <p:style>
+          <a:lnRef idx="0">
+            <a:scrgbClr r="0" g="0" b="0"/>
+          </a:lnRef>
+          <a:fillRef idx="0">
+            <a:scrgbClr r="0" g="0" b="0"/>
+          </a:fillRef>
+          <a:effectRef idx="0">
+            <a:scrgbClr r="0" g="0" b="0"/>
+          </a:effectRef>
+          <a:fontRef idx="minor">
+            <a:schemeClr val="lt1"/>
+          </a:fontRef>
+        </p:style>
+        <p:txBody>
+          <a:bodyPr rtlCol="0" anchor="ctr"/>
+          <a:lstStyle/>
+          <a:p>
+            <a:pPr algn="ctr"/>
+            <a:endParaRPr lang="en-GB"/>
+          </a:p>
+        </p:txBody>
+      </p:sp>
+      <p:sp>
+        <p:nvSpPr>
+          <p:cNvPr id="11" name="Rectangle 10">
+            <a:extLst>
+              <a:ext uri="{FF2B5EF4-FFF2-40B4-BE49-F238E27FC236}">
+                <a16:creationId xmlns:a16="http://schemas.microsoft.com/office/drawing/2014/main" id="{B75A9C63-5252-4091-9A97-F51254C7A50D}"/>
+              </a:ext>
+            </a:extLst>
+          </p:cNvPr>
+          <p:cNvSpPr/>
+          <p:nvPr/>
+        </p:nvSpPr>
+        <p:spPr>
+          <a:xfrm>
+            <a:off x="-3304674" y="1540042"/>
+            <a:ext cx="753979" cy="2518611"/>
+          </a:xfrm>
+          <a:prstGeom prst="rect">
+            <a:avLst/>
+          </a:prstGeom>
+          <a:noFill/>
+          <a:ln w="9525" cap="flat" cmpd="sng" algn="ctr">
+            <a:solidFill>
+              <a:schemeClr val="accent2"/>
+            </a:solidFill>
+            <a:prstDash val="solid"/>
+            <a:round/>
+            <a:headEnd type="none" w="med" len="med"/>
+            <a:tailEnd type="none" w="med" len="med"/>
+          </a:ln>
+        </p:spPr>
+        <p:style>
+          <a:lnRef idx="0">
+            <a:scrgbClr r="0" g="0" b="0"/>
+          </a:lnRef>
+          <a:fillRef idx="0">
+            <a:scrgbClr r="0" g="0" b="0"/>
+          </a:fillRef>
+          <a:effectRef idx="0">
+            <a:scrgbClr r="0" g="0" b="0"/>
+          </a:effectRef>
+          <a:fontRef idx="minor">
+            <a:schemeClr val="accent2"/>
+          </a:fontRef>
+        </p:style>
+        <p:txBody>
+          <a:bodyPr rtlCol="0" anchor="ctr"/>
+          <a:lstStyle/>
+          <a:p>
+            <a:pPr algn="ctr"/>
+            <a:endParaRPr lang="en-GB"/>
+          </a:p>
+        </p:txBody>
+      </p:sp>
+      <p:sp>
+        <p:nvSpPr>
+          <p:cNvPr id="13" name="Arrow: Curved Left 12">
+            <a:extLst>
+              <a:ext uri="{FF2B5EF4-FFF2-40B4-BE49-F238E27FC236}">
+                <a16:creationId xmlns:a16="http://schemas.microsoft.com/office/drawing/2014/main" id="{B5B0205A-68E7-4A59-A2EB-00812B25B8A8}"/>
+              </a:ext>
+            </a:extLst>
+          </p:cNvPr>
+          <p:cNvSpPr/>
+          <p:nvPr/>
+        </p:nvSpPr>
+        <p:spPr>
+          <a:xfrm>
+            <a:off x="-2550695" y="1540042"/>
+            <a:ext cx="304800" cy="417095"/>
+          </a:xfrm>
+          <a:prstGeom prst="curvedLeftArrow">
+            <a:avLst/>
+          </a:prstGeom>
+          <a:solidFill>
+            <a:schemeClr val="accent2">
+              <a:lumMod val="50000"/>
+            </a:schemeClr>
+          </a:solidFill>
+          <a:ln>
+            <a:solidFill>
+              <a:schemeClr val="tx1">
+                <a:lumMod val="95000"/>
+                <a:lumOff val="5000"/>
+              </a:schemeClr>
+            </a:solidFill>
+          </a:ln>
+        </p:spPr>
+        <p:style>
+          <a:lnRef idx="2">
+            <a:schemeClr val="accent1">
+              <a:shade val="50000"/>
+            </a:schemeClr>
+          </a:lnRef>
+          <a:fillRef idx="1">
+            <a:schemeClr val="accent1"/>
+          </a:fillRef>
+          <a:effectRef idx="0">
+            <a:schemeClr val="accent1"/>
+          </a:effectRef>
+          <a:fontRef idx="minor">
+            <a:schemeClr val="lt1"/>
+          </a:fontRef>
+        </p:style>
+        <p:txBody>
+          <a:bodyPr rtlCol="0" anchor="ctr"/>
+          <a:lstStyle/>
+          <a:p>
+            <a:pPr algn="ctr"/>
+            <a:endParaRPr lang="en-GB">
+              <a:solidFill>
+                <a:schemeClr val="tx1"/>
+              </a:solidFill>
+            </a:endParaRPr>
+          </a:p>
+        </p:txBody>
+      </p:sp>
+      <p:sp>
+        <p:nvSpPr>
+          <p:cNvPr id="15" name="Minus Sign 14">
+            <a:extLst>
+              <a:ext uri="{FF2B5EF4-FFF2-40B4-BE49-F238E27FC236}">
+                <a16:creationId xmlns:a16="http://schemas.microsoft.com/office/drawing/2014/main" id="{1E056766-56C9-473B-88C8-E2F4C619A8A8}"/>
+              </a:ext>
+            </a:extLst>
+          </p:cNvPr>
+          <p:cNvSpPr/>
+          <p:nvPr/>
+        </p:nvSpPr>
+        <p:spPr>
+          <a:xfrm>
+            <a:off x="-2446421" y="1580146"/>
+            <a:ext cx="368968" cy="352927"/>
+          </a:xfrm>
+          <a:prstGeom prst="mathMinus">
+            <a:avLst/>
+          </a:prstGeom>
+          <a:solidFill>
+            <a:schemeClr val="accent2">
+              <a:lumMod val="75000"/>
+            </a:schemeClr>
+          </a:solidFill>
+          <a:ln>
+            <a:solidFill>
+              <a:schemeClr val="tx1"/>
+            </a:solidFill>
+          </a:ln>
+        </p:spPr>
+        <p:style>
+          <a:lnRef idx="2">
+            <a:schemeClr val="accent1">
+              <a:shade val="50000"/>
+            </a:schemeClr>
+          </a:lnRef>
+          <a:fillRef idx="1">
+            <a:schemeClr val="accent1"/>
+          </a:fillRef>
+          <a:effectRef idx="0">
+            <a:schemeClr val="accent1"/>
+          </a:effectRef>
+          <a:fontRef idx="minor">
+            <a:schemeClr val="lt1"/>
+          </a:fontRef>
+        </p:style>
+        <p:txBody>
+          <a:bodyPr rtlCol="0" anchor="ctr"/>
+          <a:lstStyle/>
+          <a:p>
+            <a:pPr algn="ctr"/>
+            <a:endParaRPr lang="en-GB"/>
+          </a:p>
+        </p:txBody>
+      </p:sp>
+      <p:sp>
+        <p:nvSpPr>
+          <p:cNvPr id="16" name="Arrow: Curved Left 15">
+            <a:extLst>
+              <a:ext uri="{FF2B5EF4-FFF2-40B4-BE49-F238E27FC236}">
+                <a16:creationId xmlns:a16="http://schemas.microsoft.com/office/drawing/2014/main" id="{FE7DE681-82C1-40DA-AA75-502F63BAA160}"/>
+              </a:ext>
+            </a:extLst>
+          </p:cNvPr>
+          <p:cNvSpPr/>
+          <p:nvPr/>
+        </p:nvSpPr>
+        <p:spPr>
+          <a:xfrm>
+            <a:off x="-2558715" y="2077450"/>
+            <a:ext cx="312820" cy="417095"/>
+          </a:xfrm>
+          <a:prstGeom prst="curvedLeftArrow">
+            <a:avLst/>
+          </a:prstGeom>
+          <a:solidFill>
+            <a:schemeClr val="accent2">
+              <a:lumMod val="50000"/>
+            </a:schemeClr>
+          </a:solidFill>
+          <a:ln>
+            <a:solidFill>
+              <a:schemeClr val="tx1">
+                <a:lumMod val="95000"/>
+                <a:lumOff val="5000"/>
+              </a:schemeClr>
+            </a:solidFill>
+          </a:ln>
+        </p:spPr>
+        <p:style>
+          <a:lnRef idx="2">
+            <a:schemeClr val="accent1">
+              <a:shade val="50000"/>
+            </a:schemeClr>
+          </a:lnRef>
+          <a:fillRef idx="1">
+            <a:schemeClr val="accent1"/>
+          </a:fillRef>
+          <a:effectRef idx="0">
+            <a:schemeClr val="accent1"/>
+          </a:effectRef>
+          <a:fontRef idx="minor">
+            <a:schemeClr val="lt1"/>
+          </a:fontRef>
+        </p:style>
+        <p:txBody>
+          <a:bodyPr rtlCol="0" anchor="ctr"/>
+          <a:lstStyle/>
+          <a:p>
+            <a:pPr algn="ctr"/>
+            <a:endParaRPr lang="en-GB">
+              <a:solidFill>
+                <a:schemeClr val="tx1"/>
+              </a:solidFill>
+            </a:endParaRPr>
+          </a:p>
+        </p:txBody>
+      </p:sp>
+      <p:sp>
+        <p:nvSpPr>
+          <p:cNvPr id="17" name="Minus Sign 16">
+            <a:extLst>
+              <a:ext uri="{FF2B5EF4-FFF2-40B4-BE49-F238E27FC236}">
+                <a16:creationId xmlns:a16="http://schemas.microsoft.com/office/drawing/2014/main" id="{C30B8003-B04C-4E0E-954A-EA32630E7A2B}"/>
+              </a:ext>
+            </a:extLst>
+          </p:cNvPr>
+          <p:cNvSpPr/>
+          <p:nvPr/>
+        </p:nvSpPr>
+        <p:spPr>
+          <a:xfrm>
+            <a:off x="-2454441" y="2117554"/>
+            <a:ext cx="368968" cy="352927"/>
+          </a:xfrm>
+          <a:prstGeom prst="mathMinus">
+            <a:avLst/>
+          </a:prstGeom>
+          <a:solidFill>
+            <a:schemeClr val="accent2">
+              <a:lumMod val="75000"/>
+            </a:schemeClr>
+          </a:solidFill>
+          <a:ln>
+            <a:solidFill>
+              <a:schemeClr val="tx1"/>
+            </a:solidFill>
+          </a:ln>
+        </p:spPr>
+        <p:style>
+          <a:lnRef idx="2">
+            <a:schemeClr val="accent1">
+              <a:shade val="50000"/>
+            </a:schemeClr>
+          </a:lnRef>
+          <a:fillRef idx="1">
+            <a:schemeClr val="accent1"/>
+          </a:fillRef>
+          <a:effectRef idx="0">
+            <a:schemeClr val="accent1"/>
+          </a:effectRef>
+          <a:fontRef idx="minor">
+            <a:schemeClr val="lt1"/>
+          </a:fontRef>
+        </p:style>
+        <p:txBody>
+          <a:bodyPr rtlCol="0" anchor="ctr"/>
+          <a:lstStyle/>
+          <a:p>
+            <a:pPr algn="ctr"/>
+            <a:endParaRPr lang="en-GB"/>
+          </a:p>
+        </p:txBody>
+      </p:sp>
+      <p:cxnSp>
+        <p:nvCxnSpPr>
+          <p:cNvPr id="21" name="Straight Arrow Connector 20">
+            <a:extLst>
+              <a:ext uri="{FF2B5EF4-FFF2-40B4-BE49-F238E27FC236}">
+                <a16:creationId xmlns:a16="http://schemas.microsoft.com/office/drawing/2014/main" id="{D7D82E12-BCD4-4D6A-8FD7-9E65EFF2A6E1}"/>
+              </a:ext>
+            </a:extLst>
+          </p:cNvPr>
+          <p:cNvCxnSpPr/>
+          <p:nvPr/>
+        </p:nvCxnSpPr>
+        <p:spPr>
+          <a:xfrm>
+            <a:off x="-2077453" y="1780674"/>
+            <a:ext cx="11686674" cy="168441"/>
+          </a:xfrm>
+          <a:prstGeom prst="straightConnector1">
+            <a:avLst/>
+          </a:prstGeom>
+          <a:ln>
+            <a:tailEnd type="triangle"/>
+          </a:ln>
+        </p:spPr>
+        <p:style>
+          <a:lnRef idx="3">
+            <a:schemeClr val="dk1"/>
+          </a:lnRef>
+          <a:fillRef idx="0">
+            <a:schemeClr val="dk1"/>
+          </a:fillRef>
+          <a:effectRef idx="2">
+            <a:schemeClr val="dk1"/>
+          </a:effectRef>
+          <a:fontRef idx="minor">
+            <a:schemeClr val="tx1"/>
+          </a:fontRef>
+        </p:style>
+      </p:cxnSp>
+      <p:sp>
+        <p:nvSpPr>
+          <p:cNvPr id="22" name="Oval 21">
+            <a:extLst>
+              <a:ext uri="{FF2B5EF4-FFF2-40B4-BE49-F238E27FC236}">
+                <a16:creationId xmlns:a16="http://schemas.microsoft.com/office/drawing/2014/main" id="{118CF549-A265-4EA1-B34E-3C3041EB2C71}"/>
+              </a:ext>
+            </a:extLst>
+          </p:cNvPr>
+          <p:cNvSpPr/>
+          <p:nvPr/>
+        </p:nvSpPr>
+        <p:spPr>
+          <a:xfrm>
+            <a:off x="9657347" y="1748589"/>
+            <a:ext cx="673769" cy="312819"/>
+          </a:xfrm>
+          <a:prstGeom prst="ellipse">
+            <a:avLst/>
+          </a:prstGeom>
+          <a:noFill/>
+          <a:ln w="12700" cap="flat" cmpd="sng" algn="ctr">
+            <a:solidFill>
+              <a:schemeClr val="accent5"/>
+            </a:solidFill>
+            <a:prstDash val="solid"/>
+            <a:round/>
+            <a:headEnd type="none" w="med" len="med"/>
+            <a:tailEnd type="none" w="med" len="med"/>
+          </a:ln>
+        </p:spPr>
+        <p:style>
+          <a:lnRef idx="0">
+            <a:scrgbClr r="0" g="0" b="0"/>
+          </a:lnRef>
+          <a:fillRef idx="0">
+            <a:scrgbClr r="0" g="0" b="0"/>
+          </a:fillRef>
+          <a:effectRef idx="0">
+            <a:scrgbClr r="0" g="0" b="0"/>
+          </a:effectRef>
+          <a:fontRef idx="minor">
+            <a:schemeClr val="accent5"/>
+          </a:fontRef>
+        </p:style>
+        <p:txBody>
+          <a:bodyPr rtlCol="0" anchor="ctr"/>
+          <a:lstStyle/>
+          <a:p>
+            <a:pPr algn="ctr"/>
+            <a:endParaRPr lang="en-GB"/>
+          </a:p>
+        </p:txBody>
+      </p:sp>
+      <p:sp>
+        <p:nvSpPr>
+          <p:cNvPr id="23" name="Rectangle 22">
+            <a:extLst>
+              <a:ext uri="{FF2B5EF4-FFF2-40B4-BE49-F238E27FC236}">
+                <a16:creationId xmlns:a16="http://schemas.microsoft.com/office/drawing/2014/main" id="{D1873755-3A44-4A06-8D60-915DCC65B6BD}"/>
+              </a:ext>
+            </a:extLst>
+          </p:cNvPr>
+          <p:cNvSpPr/>
+          <p:nvPr/>
+        </p:nvSpPr>
+        <p:spPr>
+          <a:xfrm>
+            <a:off x="10375794" y="1548062"/>
+            <a:ext cx="4158353" cy="2518611"/>
+          </a:xfrm>
+          <a:prstGeom prst="rect">
+            <a:avLst/>
+          </a:prstGeom>
+          <a:solidFill>
+            <a:schemeClr val="accent4">
+              <a:alpha val="50000"/>
+            </a:schemeClr>
+          </a:solidFill>
+          <a:ln>
+            <a:noFill/>
+          </a:ln>
+        </p:spPr>
+        <p:style>
+          <a:lnRef idx="0">
+            <a:scrgbClr r="0" g="0" b="0"/>
+          </a:lnRef>
+          <a:fillRef idx="0">
+            <a:scrgbClr r="0" g="0" b="0"/>
+          </a:fillRef>
+          <a:effectRef idx="0">
+            <a:scrgbClr r="0" g="0" b="0"/>
+          </a:effectRef>
+          <a:fontRef idx="minor">
+            <a:schemeClr val="lt1"/>
+          </a:fontRef>
+        </p:style>
+        <p:txBody>
+          <a:bodyPr rtlCol="0" anchor="ctr"/>
+          <a:lstStyle/>
+          <a:p>
+            <a:pPr algn="ctr"/>
+            <a:endParaRPr lang="en-GB"/>
+          </a:p>
+        </p:txBody>
+      </p:sp>
+      <p:sp>
+        <p:nvSpPr>
+          <p:cNvPr id="25" name="Rectangle 24">
+            <a:extLst>
+              <a:ext uri="{FF2B5EF4-FFF2-40B4-BE49-F238E27FC236}">
+                <a16:creationId xmlns:a16="http://schemas.microsoft.com/office/drawing/2014/main" id="{5DB158F1-7E68-4A9A-9648-A4B492B529D9}"/>
+              </a:ext>
+            </a:extLst>
+          </p:cNvPr>
+          <p:cNvSpPr/>
+          <p:nvPr/>
+        </p:nvSpPr>
+        <p:spPr>
+          <a:xfrm>
+            <a:off x="9320463" y="1540041"/>
+            <a:ext cx="1055331" cy="2518611"/>
+          </a:xfrm>
+          <a:prstGeom prst="rect">
+            <a:avLst/>
+          </a:prstGeom>
+          <a:noFill/>
+          <a:ln w="9525" cap="flat" cmpd="sng" algn="ctr">
+            <a:solidFill>
+              <a:schemeClr val="accent4"/>
+            </a:solidFill>
+            <a:prstDash val="solid"/>
+            <a:round/>
+            <a:headEnd type="none" w="med" len="med"/>
+            <a:tailEnd type="none" w="med" len="med"/>
+          </a:ln>
+        </p:spPr>
+        <p:style>
+          <a:lnRef idx="0">
+            <a:scrgbClr r="0" g="0" b="0"/>
+          </a:lnRef>
+          <a:fillRef idx="0">
+            <a:scrgbClr r="0" g="0" b="0"/>
+          </a:fillRef>
+          <a:effectRef idx="0">
+            <a:scrgbClr r="0" g="0" b="0"/>
+          </a:effectRef>
+          <a:fontRef idx="minor">
+            <a:schemeClr val="accent4"/>
+          </a:fontRef>
+        </p:style>
+        <p:txBody>
+          <a:bodyPr rtlCol="0" anchor="ctr"/>
+          <a:lstStyle/>
+          <a:p>
+            <a:pPr algn="ctr"/>
+            <a:endParaRPr lang="en-GB"/>
+          </a:p>
+        </p:txBody>
+      </p:sp>
+    </p:spTree>
+    <p:extLst>
+      <p:ext uri="{BB962C8B-B14F-4D97-AF65-F5344CB8AC3E}">
+        <p14:creationId xmlns:p14="http://schemas.microsoft.com/office/powerpoint/2010/main" val="389115255"/>
       </p:ext>
     </p:extLst>
   </p:cSld>

</xml_diff>

<commit_message>
proc format - catalog
</commit_message>
<xml_diff>
--- a/screenshots/imgs.pptx
+++ b/screenshots/imgs.pptx
@@ -22,6 +22,7 @@
     <p:sldId id="270" r:id="rId16"/>
     <p:sldId id="271" r:id="rId17"/>
     <p:sldId id="272" r:id="rId18"/>
+    <p:sldId id="273" r:id="rId19"/>
   </p:sldIdLst>
   <p:sldSz cx="12192000" cy="6858000"/>
   <p:notesSz cx="6858000" cy="9144000"/>
@@ -8735,6 +8736,691 @@
 </p:sld>
 </file>
 
+<file path=ppt/slides/slide18.xml><?xml version="1.0" encoding="utf-8"?>
+<p:sld xmlns:a="http://schemas.openxmlformats.org/drawingml/2006/main" xmlns:r="http://schemas.openxmlformats.org/officeDocument/2006/relationships" xmlns:p="http://schemas.openxmlformats.org/presentationml/2006/main">
+  <p:cSld>
+    <p:spTree>
+      <p:nvGrpSpPr>
+        <p:cNvPr id="1" name=""/>
+        <p:cNvGrpSpPr/>
+        <p:nvPr/>
+      </p:nvGrpSpPr>
+      <p:grpSpPr>
+        <a:xfrm>
+          <a:off x="0" y="0"/>
+          <a:ext cx="0" cy="0"/>
+          <a:chOff x="0" y="0"/>
+          <a:chExt cx="0" cy="0"/>
+        </a:xfrm>
+      </p:grpSpPr>
+      <p:pic>
+        <p:nvPicPr>
+          <p:cNvPr id="5" name="Picture 4" descr="Table&#10;&#10;Description automatically generated">
+            <a:extLst>
+              <a:ext uri="{FF2B5EF4-FFF2-40B4-BE49-F238E27FC236}">
+                <a16:creationId xmlns:a16="http://schemas.microsoft.com/office/drawing/2014/main" id="{21150EE5-FEF5-47CF-8D29-2079199B5D8C}"/>
+              </a:ext>
+            </a:extLst>
+          </p:cNvPr>
+          <p:cNvPicPr>
+            <a:picLocks noChangeAspect="1"/>
+          </p:cNvPicPr>
+          <p:nvPr/>
+        </p:nvPicPr>
+        <p:blipFill>
+          <a:blip r:embed="rId2">
+            <a:extLst>
+              <a:ext uri="{28A0092B-C50C-407E-A947-70E740481C1C}">
+                <a14:useLocalDpi xmlns:a14="http://schemas.microsoft.com/office/drawing/2010/main" val="0"/>
+              </a:ext>
+            </a:extLst>
+          </a:blip>
+          <a:stretch>
+            <a:fillRect/>
+          </a:stretch>
+        </p:blipFill>
+        <p:spPr>
+          <a:xfrm>
+            <a:off x="1930694" y="36792"/>
+            <a:ext cx="8207038" cy="7131115"/>
+          </a:xfrm>
+          <a:prstGeom prst="rect">
+            <a:avLst/>
+          </a:prstGeom>
+        </p:spPr>
+      </p:pic>
+      <p:sp>
+        <p:nvSpPr>
+          <p:cNvPr id="6" name="Rectangle 5">
+            <a:extLst>
+              <a:ext uri="{FF2B5EF4-FFF2-40B4-BE49-F238E27FC236}">
+                <a16:creationId xmlns:a16="http://schemas.microsoft.com/office/drawing/2014/main" id="{2BAC04C9-BC92-48DD-B762-F91B512CAB20}"/>
+              </a:ext>
+            </a:extLst>
+          </p:cNvPr>
+          <p:cNvSpPr/>
+          <p:nvPr/>
+        </p:nvSpPr>
+        <p:spPr>
+          <a:xfrm>
+            <a:off x="2054267" y="463463"/>
+            <a:ext cx="7935893" cy="2826766"/>
+          </a:xfrm>
+          <a:prstGeom prst="rect">
+            <a:avLst/>
+          </a:prstGeom>
+          <a:solidFill>
+            <a:schemeClr val="accent2">
+              <a:alpha val="30000"/>
+            </a:schemeClr>
+          </a:solidFill>
+          <a:ln>
+            <a:solidFill>
+              <a:srgbClr val="C00000"/>
+            </a:solidFill>
+          </a:ln>
+        </p:spPr>
+        <p:style>
+          <a:lnRef idx="0">
+            <a:scrgbClr r="0" g="0" b="0"/>
+          </a:lnRef>
+          <a:fillRef idx="0">
+            <a:scrgbClr r="0" g="0" b="0"/>
+          </a:fillRef>
+          <a:effectRef idx="0">
+            <a:scrgbClr r="0" g="0" b="0"/>
+          </a:effectRef>
+          <a:fontRef idx="minor">
+            <a:schemeClr val="lt1"/>
+          </a:fontRef>
+        </p:style>
+        <p:txBody>
+          <a:bodyPr rtlCol="0" anchor="ctr"/>
+          <a:lstStyle/>
+          <a:p>
+            <a:pPr algn="ctr"/>
+            <a:endParaRPr lang="en-GB"/>
+          </a:p>
+        </p:txBody>
+      </p:sp>
+      <p:sp>
+        <p:nvSpPr>
+          <p:cNvPr id="7" name="Rectangle 6">
+            <a:extLst>
+              <a:ext uri="{FF2B5EF4-FFF2-40B4-BE49-F238E27FC236}">
+                <a16:creationId xmlns:a16="http://schemas.microsoft.com/office/drawing/2014/main" id="{4A199A12-53BF-47B1-9916-3789B7B3BE5D}"/>
+              </a:ext>
+            </a:extLst>
+          </p:cNvPr>
+          <p:cNvSpPr/>
+          <p:nvPr/>
+        </p:nvSpPr>
+        <p:spPr>
+          <a:xfrm>
+            <a:off x="3304628" y="1176944"/>
+            <a:ext cx="6685532" cy="760316"/>
+          </a:xfrm>
+          <a:prstGeom prst="rect">
+            <a:avLst/>
+          </a:prstGeom>
+          <a:solidFill>
+            <a:schemeClr val="dk1">
+              <a:alpha val="90000"/>
+            </a:schemeClr>
+          </a:solidFill>
+        </p:spPr>
+        <p:style>
+          <a:lnRef idx="2">
+            <a:schemeClr val="dk1">
+              <a:shade val="50000"/>
+            </a:schemeClr>
+          </a:lnRef>
+          <a:fillRef idx="1">
+            <a:schemeClr val="dk1"/>
+          </a:fillRef>
+          <a:effectRef idx="0">
+            <a:schemeClr val="dk1"/>
+          </a:effectRef>
+          <a:fontRef idx="minor">
+            <a:schemeClr val="lt1"/>
+          </a:fontRef>
+        </p:style>
+        <p:txBody>
+          <a:bodyPr rtlCol="0" anchor="ctr"/>
+          <a:lstStyle/>
+          <a:p>
+            <a:pPr algn="ctr"/>
+            <a:r>
+              <a:rPr lang="it-IT" dirty="0" err="1"/>
+              <a:t>Path</a:t>
+            </a:r>
+            <a:r>
+              <a:rPr lang="it-IT" dirty="0"/>
+              <a:t> to </a:t>
+            </a:r>
+            <a:r>
+              <a:rPr lang="it-IT" dirty="0" err="1"/>
+              <a:t>fisical</a:t>
+            </a:r>
+            <a:r>
+              <a:rPr lang="it-IT" dirty="0"/>
+              <a:t> and file names</a:t>
+            </a:r>
+          </a:p>
+          <a:p>
+            <a:pPr algn="ctr"/>
+            <a:r>
+              <a:rPr lang="it-IT" dirty="0"/>
+              <a:t>Your </a:t>
+            </a:r>
+            <a:r>
+              <a:rPr lang="it-IT" dirty="0" err="1"/>
+              <a:t>incode</a:t>
+            </a:r>
+            <a:r>
+              <a:rPr lang="it-IT" dirty="0"/>
+              <a:t> </a:t>
+            </a:r>
+            <a:r>
+              <a:rPr lang="it-IT" dirty="0" err="1"/>
+              <a:t>number</a:t>
+            </a:r>
+            <a:endParaRPr lang="it-IT" dirty="0"/>
+          </a:p>
+        </p:txBody>
+      </p:sp>
+      <p:sp>
+        <p:nvSpPr>
+          <p:cNvPr id="8" name="TextBox 7">
+            <a:extLst>
+              <a:ext uri="{FF2B5EF4-FFF2-40B4-BE49-F238E27FC236}">
+                <a16:creationId xmlns:a16="http://schemas.microsoft.com/office/drawing/2014/main" id="{F921AE54-0A64-413B-BE6F-642F5E4E64B8}"/>
+              </a:ext>
+            </a:extLst>
+          </p:cNvPr>
+          <p:cNvSpPr txBox="1"/>
+          <p:nvPr/>
+        </p:nvSpPr>
+        <p:spPr>
+          <a:xfrm>
+            <a:off x="-248090" y="2290694"/>
+            <a:ext cx="2079320" cy="646331"/>
+          </a:xfrm>
+          <a:prstGeom prst="rect">
+            <a:avLst/>
+          </a:prstGeom>
+          <a:ln>
+            <a:solidFill>
+              <a:srgbClr val="C00000"/>
+            </a:solidFill>
+          </a:ln>
+        </p:spPr>
+        <p:style>
+          <a:lnRef idx="2">
+            <a:schemeClr val="accent2"/>
+          </a:lnRef>
+          <a:fillRef idx="1">
+            <a:schemeClr val="lt1"/>
+          </a:fillRef>
+          <a:effectRef idx="0">
+            <a:schemeClr val="accent2"/>
+          </a:effectRef>
+          <a:fontRef idx="minor">
+            <a:schemeClr val="dk1"/>
+          </a:fontRef>
+        </p:style>
+        <p:txBody>
+          <a:bodyPr wrap="square" rtlCol="0">
+            <a:spAutoFit/>
+          </a:bodyPr>
+          <a:lstStyle/>
+          <a:p>
+            <a:r>
+              <a:rPr lang="it-IT" dirty="0"/>
+              <a:t>General information on </a:t>
+            </a:r>
+            <a:r>
+              <a:rPr lang="it-IT" dirty="0" err="1"/>
+              <a:t>your</a:t>
+            </a:r>
+            <a:r>
+              <a:rPr lang="it-IT" dirty="0"/>
+              <a:t> directory</a:t>
+            </a:r>
+            <a:endParaRPr lang="en-GB" dirty="0"/>
+          </a:p>
+        </p:txBody>
+      </p:sp>
+      <p:cxnSp>
+        <p:nvCxnSpPr>
+          <p:cNvPr id="9" name="Straight Arrow Connector 8">
+            <a:extLst>
+              <a:ext uri="{FF2B5EF4-FFF2-40B4-BE49-F238E27FC236}">
+                <a16:creationId xmlns:a16="http://schemas.microsoft.com/office/drawing/2014/main" id="{8A1FFBD9-6FE9-43CB-862B-3DE708F926CE}"/>
+              </a:ext>
+            </a:extLst>
+          </p:cNvPr>
+          <p:cNvCxnSpPr>
+            <a:cxnSpLocks/>
+            <a:stCxn id="8" idx="0"/>
+            <a:endCxn id="6" idx="1"/>
+          </p:cNvCxnSpPr>
+          <p:nvPr/>
+        </p:nvCxnSpPr>
+        <p:spPr>
+          <a:xfrm flipV="1">
+            <a:off x="791570" y="1876846"/>
+            <a:ext cx="1262697" cy="413848"/>
+          </a:xfrm>
+          <a:prstGeom prst="straightConnector1">
+            <a:avLst/>
+          </a:prstGeom>
+          <a:ln>
+            <a:solidFill>
+              <a:srgbClr val="C00000"/>
+            </a:solidFill>
+            <a:tailEnd type="triangle"/>
+          </a:ln>
+        </p:spPr>
+        <p:style>
+          <a:lnRef idx="3">
+            <a:schemeClr val="dk1"/>
+          </a:lnRef>
+          <a:fillRef idx="0">
+            <a:schemeClr val="dk1"/>
+          </a:fillRef>
+          <a:effectRef idx="2">
+            <a:schemeClr val="dk1"/>
+          </a:effectRef>
+          <a:fontRef idx="minor">
+            <a:schemeClr val="tx1"/>
+          </a:fontRef>
+        </p:style>
+      </p:cxnSp>
+      <p:sp>
+        <p:nvSpPr>
+          <p:cNvPr id="10" name="Rectangle 9">
+            <a:extLst>
+              <a:ext uri="{FF2B5EF4-FFF2-40B4-BE49-F238E27FC236}">
+                <a16:creationId xmlns:a16="http://schemas.microsoft.com/office/drawing/2014/main" id="{1A608EE9-B3CB-41C4-9D9A-EC6088A5FC5A}"/>
+              </a:ext>
+            </a:extLst>
+          </p:cNvPr>
+          <p:cNvSpPr/>
+          <p:nvPr/>
+        </p:nvSpPr>
+        <p:spPr>
+          <a:xfrm>
+            <a:off x="3971499" y="3515961"/>
+            <a:ext cx="4079683" cy="3342039"/>
+          </a:xfrm>
+          <a:prstGeom prst="rect">
+            <a:avLst/>
+          </a:prstGeom>
+          <a:solidFill>
+            <a:schemeClr val="accent4">
+              <a:alpha val="10000"/>
+            </a:schemeClr>
+          </a:solidFill>
+          <a:ln>
+            <a:solidFill>
+              <a:schemeClr val="accent2">
+                <a:lumMod val="50000"/>
+              </a:schemeClr>
+            </a:solidFill>
+          </a:ln>
+        </p:spPr>
+        <p:style>
+          <a:lnRef idx="0">
+            <a:scrgbClr r="0" g="0" b="0"/>
+          </a:lnRef>
+          <a:fillRef idx="0">
+            <a:scrgbClr r="0" g="0" b="0"/>
+          </a:fillRef>
+          <a:effectRef idx="0">
+            <a:scrgbClr r="0" g="0" b="0"/>
+          </a:effectRef>
+          <a:fontRef idx="minor">
+            <a:schemeClr val="lt1"/>
+          </a:fontRef>
+        </p:style>
+        <p:txBody>
+          <a:bodyPr rtlCol="0" anchor="ctr"/>
+          <a:lstStyle/>
+          <a:p>
+            <a:pPr algn="ctr"/>
+            <a:endParaRPr lang="en-GB"/>
+          </a:p>
+        </p:txBody>
+      </p:sp>
+      <p:sp>
+        <p:nvSpPr>
+          <p:cNvPr id="11" name="TextBox 10">
+            <a:extLst>
+              <a:ext uri="{FF2B5EF4-FFF2-40B4-BE49-F238E27FC236}">
+                <a16:creationId xmlns:a16="http://schemas.microsoft.com/office/drawing/2014/main" id="{67307420-E7CD-452A-B4B5-3D7CFC532219}"/>
+              </a:ext>
+            </a:extLst>
+          </p:cNvPr>
+          <p:cNvSpPr txBox="1"/>
+          <p:nvPr/>
+        </p:nvSpPr>
+        <p:spPr>
+          <a:xfrm>
+            <a:off x="8853593" y="4125225"/>
+            <a:ext cx="2799545" cy="646331"/>
+          </a:xfrm>
+          <a:prstGeom prst="rect">
+            <a:avLst/>
+          </a:prstGeom>
+          <a:ln>
+            <a:solidFill>
+              <a:schemeClr val="accent2">
+                <a:lumMod val="50000"/>
+              </a:schemeClr>
+            </a:solidFill>
+          </a:ln>
+        </p:spPr>
+        <p:style>
+          <a:lnRef idx="2">
+            <a:schemeClr val="accent2"/>
+          </a:lnRef>
+          <a:fillRef idx="1">
+            <a:schemeClr val="lt1"/>
+          </a:fillRef>
+          <a:effectRef idx="0">
+            <a:schemeClr val="accent2"/>
+          </a:effectRef>
+          <a:fontRef idx="minor">
+            <a:schemeClr val="dk1"/>
+          </a:fontRef>
+        </p:style>
+        <p:txBody>
+          <a:bodyPr wrap="square" rtlCol="0">
+            <a:spAutoFit/>
+          </a:bodyPr>
+          <a:lstStyle/>
+          <a:p>
+            <a:r>
+              <a:rPr lang="it-IT" dirty="0" err="1"/>
+              <a:t>Catalogs</a:t>
+            </a:r>
+            <a:r>
+              <a:rPr lang="it-IT" dirty="0"/>
+              <a:t> </a:t>
+            </a:r>
+            <a:r>
+              <a:rPr lang="it-IT" b="1" dirty="0" err="1"/>
+              <a:t>already</a:t>
+            </a:r>
+            <a:r>
+              <a:rPr lang="it-IT" dirty="0"/>
+              <a:t> </a:t>
+            </a:r>
+            <a:r>
+              <a:rPr lang="it-IT" dirty="0" err="1"/>
+              <a:t>present</a:t>
+            </a:r>
+            <a:r>
+              <a:rPr lang="it-IT" dirty="0"/>
+              <a:t> in the directory.</a:t>
+            </a:r>
+            <a:endParaRPr lang="en-GB" dirty="0"/>
+          </a:p>
+        </p:txBody>
+      </p:sp>
+      <p:cxnSp>
+        <p:nvCxnSpPr>
+          <p:cNvPr id="12" name="Straight Arrow Connector 11">
+            <a:extLst>
+              <a:ext uri="{FF2B5EF4-FFF2-40B4-BE49-F238E27FC236}">
+                <a16:creationId xmlns:a16="http://schemas.microsoft.com/office/drawing/2014/main" id="{290F3CD4-C4D9-43D9-8B47-8385DE8E8552}"/>
+              </a:ext>
+            </a:extLst>
+          </p:cNvPr>
+          <p:cNvCxnSpPr>
+            <a:cxnSpLocks/>
+            <a:stCxn id="11" idx="1"/>
+          </p:cNvCxnSpPr>
+          <p:nvPr/>
+        </p:nvCxnSpPr>
+        <p:spPr>
+          <a:xfrm flipH="1">
+            <a:off x="8049253" y="4448391"/>
+            <a:ext cx="804340" cy="924466"/>
+          </a:xfrm>
+          <a:prstGeom prst="straightConnector1">
+            <a:avLst/>
+          </a:prstGeom>
+          <a:ln>
+            <a:solidFill>
+              <a:schemeClr val="accent2">
+                <a:lumMod val="50000"/>
+              </a:schemeClr>
+            </a:solidFill>
+            <a:tailEnd type="triangle"/>
+          </a:ln>
+        </p:spPr>
+        <p:style>
+          <a:lnRef idx="3">
+            <a:schemeClr val="dk1"/>
+          </a:lnRef>
+          <a:fillRef idx="0">
+            <a:schemeClr val="dk1"/>
+          </a:fillRef>
+          <a:effectRef idx="2">
+            <a:schemeClr val="dk1"/>
+          </a:effectRef>
+          <a:fontRef idx="minor">
+            <a:schemeClr val="tx1"/>
+          </a:fontRef>
+        </p:style>
+      </p:cxnSp>
+      <p:sp>
+        <p:nvSpPr>
+          <p:cNvPr id="13" name="Rectangle 12">
+            <a:extLst>
+              <a:ext uri="{FF2B5EF4-FFF2-40B4-BE49-F238E27FC236}">
+                <a16:creationId xmlns:a16="http://schemas.microsoft.com/office/drawing/2014/main" id="{F1D9FE26-4A6F-4D66-8F00-F02FFB8DB4E9}"/>
+              </a:ext>
+            </a:extLst>
+          </p:cNvPr>
+          <p:cNvSpPr/>
+          <p:nvPr/>
+        </p:nvSpPr>
+        <p:spPr>
+          <a:xfrm>
+            <a:off x="3971498" y="3784264"/>
+            <a:ext cx="4079683" cy="219445"/>
+          </a:xfrm>
+          <a:prstGeom prst="rect">
+            <a:avLst/>
+          </a:prstGeom>
+          <a:solidFill>
+            <a:schemeClr val="accent4">
+              <a:alpha val="35000"/>
+            </a:schemeClr>
+          </a:solidFill>
+          <a:ln>
+            <a:solidFill>
+              <a:schemeClr val="accent4">
+                <a:lumMod val="75000"/>
+              </a:schemeClr>
+            </a:solidFill>
+          </a:ln>
+        </p:spPr>
+        <p:style>
+          <a:lnRef idx="0">
+            <a:scrgbClr r="0" g="0" b="0"/>
+          </a:lnRef>
+          <a:fillRef idx="0">
+            <a:scrgbClr r="0" g="0" b="0"/>
+          </a:fillRef>
+          <a:effectRef idx="0">
+            <a:scrgbClr r="0" g="0" b="0"/>
+          </a:effectRef>
+          <a:fontRef idx="minor">
+            <a:schemeClr val="lt1"/>
+          </a:fontRef>
+        </p:style>
+        <p:txBody>
+          <a:bodyPr rtlCol="0" anchor="ctr"/>
+          <a:lstStyle/>
+          <a:p>
+            <a:pPr algn="ctr"/>
+            <a:endParaRPr lang="en-GB"/>
+          </a:p>
+        </p:txBody>
+      </p:sp>
+      <p:sp>
+        <p:nvSpPr>
+          <p:cNvPr id="14" name="TextBox 13">
+            <a:extLst>
+              <a:ext uri="{FF2B5EF4-FFF2-40B4-BE49-F238E27FC236}">
+                <a16:creationId xmlns:a16="http://schemas.microsoft.com/office/drawing/2014/main" id="{FAC77D24-9A46-4B91-B6A6-4819C52E6C31}"/>
+              </a:ext>
+            </a:extLst>
+          </p:cNvPr>
+          <p:cNvSpPr txBox="1"/>
+          <p:nvPr/>
+        </p:nvSpPr>
+        <p:spPr>
+          <a:xfrm>
+            <a:off x="791570" y="4567306"/>
+            <a:ext cx="2671658" cy="646331"/>
+          </a:xfrm>
+          <a:prstGeom prst="rect">
+            <a:avLst/>
+          </a:prstGeom>
+          <a:ln>
+            <a:solidFill>
+              <a:schemeClr val="accent4">
+                <a:lumMod val="75000"/>
+              </a:schemeClr>
+            </a:solidFill>
+          </a:ln>
+        </p:spPr>
+        <p:style>
+          <a:lnRef idx="2">
+            <a:schemeClr val="accent2"/>
+          </a:lnRef>
+          <a:fillRef idx="1">
+            <a:schemeClr val="lt1"/>
+          </a:fillRef>
+          <a:effectRef idx="0">
+            <a:schemeClr val="accent2"/>
+          </a:effectRef>
+          <a:fontRef idx="minor">
+            <a:schemeClr val="dk1"/>
+          </a:fontRef>
+        </p:style>
+        <p:txBody>
+          <a:bodyPr wrap="square" rtlCol="0">
+            <a:spAutoFit/>
+          </a:bodyPr>
+          <a:lstStyle/>
+          <a:p>
+            <a:r>
+              <a:rPr lang="it-IT" dirty="0" err="1"/>
+              <a:t>This</a:t>
+            </a:r>
+            <a:r>
+              <a:rPr lang="it-IT" dirty="0"/>
+              <a:t> </a:t>
+            </a:r>
+            <a:r>
+              <a:rPr lang="it-IT" dirty="0" err="1"/>
+              <a:t>catalog</a:t>
+            </a:r>
+            <a:r>
+              <a:rPr lang="it-IT" dirty="0"/>
+              <a:t> stores the </a:t>
+            </a:r>
+            <a:r>
+              <a:rPr lang="it-IT" b="1" dirty="0"/>
+              <a:t>formats</a:t>
+            </a:r>
+            <a:r>
+              <a:rPr lang="it-IT" dirty="0"/>
+              <a:t> </a:t>
+            </a:r>
+            <a:r>
+              <a:rPr lang="it-IT" dirty="0" err="1"/>
+              <a:t>we’ve</a:t>
+            </a:r>
+            <a:r>
+              <a:rPr lang="it-IT" dirty="0"/>
+              <a:t> just </a:t>
+            </a:r>
+            <a:r>
+              <a:rPr lang="it-IT" dirty="0" err="1"/>
+              <a:t>created</a:t>
+            </a:r>
+            <a:endParaRPr lang="en-GB" dirty="0"/>
+          </a:p>
+        </p:txBody>
+      </p:sp>
+      <p:cxnSp>
+        <p:nvCxnSpPr>
+          <p:cNvPr id="15" name="Straight Arrow Connector 14">
+            <a:extLst>
+              <a:ext uri="{FF2B5EF4-FFF2-40B4-BE49-F238E27FC236}">
+                <a16:creationId xmlns:a16="http://schemas.microsoft.com/office/drawing/2014/main" id="{791B2E2A-233E-4776-B48F-6A41837175A4}"/>
+              </a:ext>
+            </a:extLst>
+          </p:cNvPr>
+          <p:cNvCxnSpPr>
+            <a:cxnSpLocks/>
+            <a:stCxn id="14" idx="3"/>
+            <a:endCxn id="13" idx="1"/>
+          </p:cNvCxnSpPr>
+          <p:nvPr/>
+        </p:nvCxnSpPr>
+        <p:spPr>
+          <a:xfrm flipV="1">
+            <a:off x="3463228" y="3893987"/>
+            <a:ext cx="508270" cy="996485"/>
+          </a:xfrm>
+          <a:prstGeom prst="straightConnector1">
+            <a:avLst/>
+          </a:prstGeom>
+          <a:ln>
+            <a:solidFill>
+              <a:schemeClr val="accent4">
+                <a:lumMod val="75000"/>
+              </a:schemeClr>
+            </a:solidFill>
+            <a:tailEnd type="triangle"/>
+          </a:ln>
+        </p:spPr>
+        <p:style>
+          <a:lnRef idx="3">
+            <a:schemeClr val="accent1"/>
+          </a:lnRef>
+          <a:fillRef idx="0">
+            <a:schemeClr val="accent1"/>
+          </a:fillRef>
+          <a:effectRef idx="2">
+            <a:schemeClr val="accent1"/>
+          </a:effectRef>
+          <a:fontRef idx="minor">
+            <a:schemeClr val="tx1"/>
+          </a:fontRef>
+        </p:style>
+      </p:cxnSp>
+    </p:spTree>
+    <p:extLst>
+      <p:ext uri="{BB962C8B-B14F-4D97-AF65-F5344CB8AC3E}">
+        <p14:creationId xmlns:p14="http://schemas.microsoft.com/office/powerpoint/2010/main" val="377876390"/>
+      </p:ext>
+    </p:extLst>
+  </p:cSld>
+  <p:clrMapOvr>
+    <a:masterClrMapping/>
+  </p:clrMapOvr>
+</p:sld>
+</file>
+
 <file path=ppt/slides/slide2.xml><?xml version="1.0" encoding="utf-8"?>
 <p:sld xmlns:a="http://schemas.openxmlformats.org/drawingml/2006/main" xmlns:r="http://schemas.openxmlformats.org/officeDocument/2006/relationships" xmlns:p="http://schemas.openxmlformats.org/presentationml/2006/main">
   <p:cSld>

</xml_diff>

<commit_message>
added pic to let sect
</commit_message>
<xml_diff>
--- a/screenshots/imgs.pptx
+++ b/screenshots/imgs.pptx
@@ -24,6 +24,7 @@
     <p:sldId id="272" r:id="rId18"/>
     <p:sldId id="273" r:id="rId19"/>
     <p:sldId id="274" r:id="rId20"/>
+    <p:sldId id="275" r:id="rId21"/>
   </p:sldIdLst>
   <p:sldSz cx="12192000" cy="6858000"/>
   <p:notesSz cx="6858000" cy="9144000"/>
@@ -279,7 +280,7 @@
           <a:p>
             <a:fld id="{166DC043-4AEC-4A4E-AB79-0D54B7828DD9}" type="datetimeFigureOut">
               <a:rPr lang="en-GB" smtClean="0"/>
-              <a:t>25/05/2021</a:t>
+              <a:t>27/05/2021</a:t>
             </a:fld>
             <a:endParaRPr lang="en-GB"/>
           </a:p>
@@ -479,7 +480,7 @@
           <a:p>
             <a:fld id="{166DC043-4AEC-4A4E-AB79-0D54B7828DD9}" type="datetimeFigureOut">
               <a:rPr lang="en-GB" smtClean="0"/>
-              <a:t>25/05/2021</a:t>
+              <a:t>27/05/2021</a:t>
             </a:fld>
             <a:endParaRPr lang="en-GB"/>
           </a:p>
@@ -689,7 +690,7 @@
           <a:p>
             <a:fld id="{166DC043-4AEC-4A4E-AB79-0D54B7828DD9}" type="datetimeFigureOut">
               <a:rPr lang="en-GB" smtClean="0"/>
-              <a:t>25/05/2021</a:t>
+              <a:t>27/05/2021</a:t>
             </a:fld>
             <a:endParaRPr lang="en-GB"/>
           </a:p>
@@ -889,7 +890,7 @@
           <a:p>
             <a:fld id="{166DC043-4AEC-4A4E-AB79-0D54B7828DD9}" type="datetimeFigureOut">
               <a:rPr lang="en-GB" smtClean="0"/>
-              <a:t>25/05/2021</a:t>
+              <a:t>27/05/2021</a:t>
             </a:fld>
             <a:endParaRPr lang="en-GB"/>
           </a:p>
@@ -1165,7 +1166,7 @@
           <a:p>
             <a:fld id="{166DC043-4AEC-4A4E-AB79-0D54B7828DD9}" type="datetimeFigureOut">
               <a:rPr lang="en-GB" smtClean="0"/>
-              <a:t>25/05/2021</a:t>
+              <a:t>27/05/2021</a:t>
             </a:fld>
             <a:endParaRPr lang="en-GB"/>
           </a:p>
@@ -1433,7 +1434,7 @@
           <a:p>
             <a:fld id="{166DC043-4AEC-4A4E-AB79-0D54B7828DD9}" type="datetimeFigureOut">
               <a:rPr lang="en-GB" smtClean="0"/>
-              <a:t>25/05/2021</a:t>
+              <a:t>27/05/2021</a:t>
             </a:fld>
             <a:endParaRPr lang="en-GB"/>
           </a:p>
@@ -1848,7 +1849,7 @@
           <a:p>
             <a:fld id="{166DC043-4AEC-4A4E-AB79-0D54B7828DD9}" type="datetimeFigureOut">
               <a:rPr lang="en-GB" smtClean="0"/>
-              <a:t>25/05/2021</a:t>
+              <a:t>27/05/2021</a:t>
             </a:fld>
             <a:endParaRPr lang="en-GB"/>
           </a:p>
@@ -1990,7 +1991,7 @@
           <a:p>
             <a:fld id="{166DC043-4AEC-4A4E-AB79-0D54B7828DD9}" type="datetimeFigureOut">
               <a:rPr lang="en-GB" smtClean="0"/>
-              <a:t>25/05/2021</a:t>
+              <a:t>27/05/2021</a:t>
             </a:fld>
             <a:endParaRPr lang="en-GB"/>
           </a:p>
@@ -2103,7 +2104,7 @@
           <a:p>
             <a:fld id="{166DC043-4AEC-4A4E-AB79-0D54B7828DD9}" type="datetimeFigureOut">
               <a:rPr lang="en-GB" smtClean="0"/>
-              <a:t>25/05/2021</a:t>
+              <a:t>27/05/2021</a:t>
             </a:fld>
             <a:endParaRPr lang="en-GB"/>
           </a:p>
@@ -2416,7 +2417,7 @@
           <a:p>
             <a:fld id="{166DC043-4AEC-4A4E-AB79-0D54B7828DD9}" type="datetimeFigureOut">
               <a:rPr lang="en-GB" smtClean="0"/>
-              <a:t>25/05/2021</a:t>
+              <a:t>27/05/2021</a:t>
             </a:fld>
             <a:endParaRPr lang="en-GB"/>
           </a:p>
@@ -2705,7 +2706,7 @@
           <a:p>
             <a:fld id="{166DC043-4AEC-4A4E-AB79-0D54B7828DD9}" type="datetimeFigureOut">
               <a:rPr lang="en-GB" smtClean="0"/>
-              <a:t>25/05/2021</a:t>
+              <a:t>27/05/2021</a:t>
             </a:fld>
             <a:endParaRPr lang="en-GB"/>
           </a:p>
@@ -2948,7 +2949,7 @@
           <a:p>
             <a:fld id="{166DC043-4AEC-4A4E-AB79-0D54B7828DD9}" type="datetimeFigureOut">
               <a:rPr lang="en-GB" smtClean="0"/>
-              <a:t>25/05/2021</a:t>
+              <a:t>27/05/2021</a:t>
             </a:fld>
             <a:endParaRPr lang="en-GB"/>
           </a:p>
@@ -10092,6 +10093,421 @@
 </p:sld>
 </file>
 
+<file path=ppt/slides/slide20.xml><?xml version="1.0" encoding="utf-8"?>
+<p:sld xmlns:a="http://schemas.openxmlformats.org/drawingml/2006/main" xmlns:r="http://schemas.openxmlformats.org/officeDocument/2006/relationships" xmlns:p="http://schemas.openxmlformats.org/presentationml/2006/main">
+  <p:cSld>
+    <p:spTree>
+      <p:nvGrpSpPr>
+        <p:cNvPr id="1" name=""/>
+        <p:cNvGrpSpPr/>
+        <p:nvPr/>
+      </p:nvGrpSpPr>
+      <p:grpSpPr>
+        <a:xfrm>
+          <a:off x="0" y="0"/>
+          <a:ext cx="0" cy="0"/>
+          <a:chOff x="0" y="0"/>
+          <a:chExt cx="0" cy="0"/>
+        </a:xfrm>
+      </p:grpSpPr>
+      <p:pic>
+        <p:nvPicPr>
+          <p:cNvPr id="5" name="Picture 4" descr="Graphical user interface, text, application, email&#10;&#10;Description automatically generated">
+            <a:extLst>
+              <a:ext uri="{FF2B5EF4-FFF2-40B4-BE49-F238E27FC236}">
+                <a16:creationId xmlns:a16="http://schemas.microsoft.com/office/drawing/2014/main" id="{3A48138E-4D75-4168-8BA1-66602E5FA5C6}"/>
+              </a:ext>
+            </a:extLst>
+          </p:cNvPr>
+          <p:cNvPicPr>
+            <a:picLocks noChangeAspect="1"/>
+          </p:cNvPicPr>
+          <p:nvPr/>
+        </p:nvPicPr>
+        <p:blipFill rotWithShape="1">
+          <a:blip r:embed="rId2">
+            <a:extLst>
+              <a:ext uri="{28A0092B-C50C-407E-A947-70E740481C1C}">
+                <a14:useLocalDpi xmlns:a14="http://schemas.microsoft.com/office/drawing/2010/main" val="0"/>
+              </a:ext>
+            </a:extLst>
+          </a:blip>
+          <a:srcRect b="23684"/>
+          <a:stretch/>
+        </p:blipFill>
+        <p:spPr>
+          <a:xfrm>
+            <a:off x="636251" y="1583561"/>
+            <a:ext cx="7011378" cy="3038899"/>
+          </a:xfrm>
+          <a:prstGeom prst="rect">
+            <a:avLst/>
+          </a:prstGeom>
+        </p:spPr>
+      </p:pic>
+      <p:pic>
+        <p:nvPicPr>
+          <p:cNvPr id="7" name="Picture 6" descr="Graphical user interface, text, application, Word&#10;&#10;Description automatically generated">
+            <a:extLst>
+              <a:ext uri="{FF2B5EF4-FFF2-40B4-BE49-F238E27FC236}">
+                <a16:creationId xmlns:a16="http://schemas.microsoft.com/office/drawing/2014/main" id="{E44A97A7-B3A5-4876-B245-6A5AA5987D4E}"/>
+              </a:ext>
+            </a:extLst>
+          </p:cNvPr>
+          <p:cNvPicPr>
+            <a:picLocks noChangeAspect="1"/>
+          </p:cNvPicPr>
+          <p:nvPr/>
+        </p:nvPicPr>
+        <p:blipFill>
+          <a:blip r:embed="rId3">
+            <a:extLst>
+              <a:ext uri="{28A0092B-C50C-407E-A947-70E740481C1C}">
+                <a14:useLocalDpi xmlns:a14="http://schemas.microsoft.com/office/drawing/2010/main" val="0"/>
+              </a:ext>
+            </a:extLst>
+          </a:blip>
+          <a:stretch>
+            <a:fillRect/>
+          </a:stretch>
+        </p:blipFill>
+        <p:spPr>
+          <a:xfrm>
+            <a:off x="3650839" y="1583560"/>
+            <a:ext cx="7344800" cy="3038899"/>
+          </a:xfrm>
+          <a:prstGeom prst="rect">
+            <a:avLst/>
+          </a:prstGeom>
+          <a:ln>
+            <a:noFill/>
+          </a:ln>
+          <a:effectLst>
+            <a:outerShdw blurRad="190500" algn="tl" rotWithShape="0">
+              <a:srgbClr val="000000">
+                <a:alpha val="70000"/>
+              </a:srgbClr>
+            </a:outerShdw>
+          </a:effectLst>
+        </p:spPr>
+      </p:pic>
+      <p:sp>
+        <p:nvSpPr>
+          <p:cNvPr id="8" name="TextBox 7">
+            <a:extLst>
+              <a:ext uri="{FF2B5EF4-FFF2-40B4-BE49-F238E27FC236}">
+                <a16:creationId xmlns:a16="http://schemas.microsoft.com/office/drawing/2014/main" id="{0F897251-85A0-4198-A9C2-48A82D787F01}"/>
+              </a:ext>
+            </a:extLst>
+          </p:cNvPr>
+          <p:cNvSpPr txBox="1"/>
+          <p:nvPr/>
+        </p:nvSpPr>
+        <p:spPr>
+          <a:xfrm>
+            <a:off x="1515649" y="1583559"/>
+            <a:ext cx="301686" cy="369332"/>
+          </a:xfrm>
+          <a:prstGeom prst="rect">
+            <a:avLst/>
+          </a:prstGeom>
+          <a:noFill/>
+        </p:spPr>
+        <p:txBody>
+          <a:bodyPr wrap="none" rtlCol="0">
+            <a:spAutoFit/>
+          </a:bodyPr>
+          <a:lstStyle/>
+          <a:p>
+            <a:r>
+              <a:rPr lang="it-IT" dirty="0"/>
+              <a:t>1</a:t>
+            </a:r>
+            <a:endParaRPr lang="en-GB" dirty="0"/>
+          </a:p>
+        </p:txBody>
+      </p:sp>
+      <p:sp>
+        <p:nvSpPr>
+          <p:cNvPr id="9" name="TextBox 8">
+            <a:extLst>
+              <a:ext uri="{FF2B5EF4-FFF2-40B4-BE49-F238E27FC236}">
+                <a16:creationId xmlns:a16="http://schemas.microsoft.com/office/drawing/2014/main" id="{973C8D48-B056-4705-AA61-1A5C8090D17E}"/>
+              </a:ext>
+            </a:extLst>
+          </p:cNvPr>
+          <p:cNvSpPr txBox="1"/>
+          <p:nvPr/>
+        </p:nvSpPr>
+        <p:spPr>
+          <a:xfrm flipH="1">
+            <a:off x="5659139" y="1583559"/>
+            <a:ext cx="301685" cy="369332"/>
+          </a:xfrm>
+          <a:prstGeom prst="rect">
+            <a:avLst/>
+          </a:prstGeom>
+          <a:noFill/>
+        </p:spPr>
+        <p:txBody>
+          <a:bodyPr wrap="square" rtlCol="0">
+            <a:spAutoFit/>
+          </a:bodyPr>
+          <a:lstStyle/>
+          <a:p>
+            <a:r>
+              <a:rPr lang="it-IT" dirty="0"/>
+              <a:t>2</a:t>
+            </a:r>
+            <a:endParaRPr lang="en-GB" dirty="0"/>
+          </a:p>
+        </p:txBody>
+      </p:sp>
+      <p:sp>
+        <p:nvSpPr>
+          <p:cNvPr id="10" name="Oval 9">
+            <a:extLst>
+              <a:ext uri="{FF2B5EF4-FFF2-40B4-BE49-F238E27FC236}">
+                <a16:creationId xmlns:a16="http://schemas.microsoft.com/office/drawing/2014/main" id="{79C54CB6-2296-441D-B971-F4BFDD1BB946}"/>
+              </a:ext>
+            </a:extLst>
+          </p:cNvPr>
+          <p:cNvSpPr/>
+          <p:nvPr/>
+        </p:nvSpPr>
+        <p:spPr>
+          <a:xfrm>
+            <a:off x="1324146" y="1461922"/>
+            <a:ext cx="651354" cy="612606"/>
+          </a:xfrm>
+          <a:prstGeom prst="ellipse">
+            <a:avLst/>
+          </a:prstGeom>
+          <a:noFill/>
+          <a:ln w="9525" cap="flat" cmpd="sng" algn="ctr">
+            <a:solidFill>
+              <a:schemeClr val="dk1"/>
+            </a:solidFill>
+            <a:prstDash val="solid"/>
+            <a:round/>
+            <a:headEnd type="none" w="med" len="med"/>
+            <a:tailEnd type="none" w="med" len="med"/>
+          </a:ln>
+        </p:spPr>
+        <p:style>
+          <a:lnRef idx="0">
+            <a:scrgbClr r="0" g="0" b="0"/>
+          </a:lnRef>
+          <a:fillRef idx="0">
+            <a:scrgbClr r="0" g="0" b="0"/>
+          </a:fillRef>
+          <a:effectRef idx="0">
+            <a:scrgbClr r="0" g="0" b="0"/>
+          </a:effectRef>
+          <a:fontRef idx="minor">
+            <a:schemeClr val="dk1"/>
+          </a:fontRef>
+        </p:style>
+        <p:txBody>
+          <a:bodyPr rtlCol="0" anchor="ctr"/>
+          <a:lstStyle/>
+          <a:p>
+            <a:pPr algn="ctr"/>
+            <a:endParaRPr lang="en-GB"/>
+          </a:p>
+        </p:txBody>
+      </p:sp>
+      <p:cxnSp>
+        <p:nvCxnSpPr>
+          <p:cNvPr id="12" name="Straight Arrow Connector 11">
+            <a:extLst>
+              <a:ext uri="{FF2B5EF4-FFF2-40B4-BE49-F238E27FC236}">
+                <a16:creationId xmlns:a16="http://schemas.microsoft.com/office/drawing/2014/main" id="{A37525E5-55F6-4F2A-96E7-D8350C1D825A}"/>
+              </a:ext>
+            </a:extLst>
+          </p:cNvPr>
+          <p:cNvCxnSpPr>
+            <a:stCxn id="10" idx="4"/>
+          </p:cNvCxnSpPr>
+          <p:nvPr/>
+        </p:nvCxnSpPr>
+        <p:spPr>
+          <a:xfrm>
+            <a:off x="1649823" y="2074528"/>
+            <a:ext cx="467076" cy="1194765"/>
+          </a:xfrm>
+          <a:prstGeom prst="straightConnector1">
+            <a:avLst/>
+          </a:prstGeom>
+          <a:ln>
+            <a:tailEnd type="triangle"/>
+          </a:ln>
+        </p:spPr>
+        <p:style>
+          <a:lnRef idx="2">
+            <a:schemeClr val="dk1"/>
+          </a:lnRef>
+          <a:fillRef idx="0">
+            <a:schemeClr val="dk1"/>
+          </a:fillRef>
+          <a:effectRef idx="1">
+            <a:schemeClr val="dk1"/>
+          </a:effectRef>
+          <a:fontRef idx="minor">
+            <a:schemeClr val="tx1"/>
+          </a:fontRef>
+        </p:style>
+      </p:cxnSp>
+      <p:cxnSp>
+        <p:nvCxnSpPr>
+          <p:cNvPr id="14" name="Straight Arrow Connector 13">
+            <a:extLst>
+              <a:ext uri="{FF2B5EF4-FFF2-40B4-BE49-F238E27FC236}">
+                <a16:creationId xmlns:a16="http://schemas.microsoft.com/office/drawing/2014/main" id="{0F5367F9-8927-46C5-AD9B-3FBDC57B717F}"/>
+              </a:ext>
+            </a:extLst>
+          </p:cNvPr>
+          <p:cNvCxnSpPr>
+            <a:cxnSpLocks/>
+            <a:stCxn id="10" idx="5"/>
+          </p:cNvCxnSpPr>
+          <p:nvPr/>
+        </p:nvCxnSpPr>
+        <p:spPr>
+          <a:xfrm>
+            <a:off x="1880111" y="1984814"/>
+            <a:ext cx="628580" cy="1603894"/>
+          </a:xfrm>
+          <a:prstGeom prst="straightConnector1">
+            <a:avLst/>
+          </a:prstGeom>
+          <a:ln>
+            <a:tailEnd type="triangle"/>
+          </a:ln>
+        </p:spPr>
+        <p:style>
+          <a:lnRef idx="2">
+            <a:schemeClr val="dk1"/>
+          </a:lnRef>
+          <a:fillRef idx="0">
+            <a:schemeClr val="dk1"/>
+          </a:fillRef>
+          <a:effectRef idx="1">
+            <a:schemeClr val="dk1"/>
+          </a:effectRef>
+          <a:fontRef idx="minor">
+            <a:schemeClr val="tx1"/>
+          </a:fontRef>
+        </p:style>
+      </p:cxnSp>
+      <p:sp>
+        <p:nvSpPr>
+          <p:cNvPr id="16" name="Oval 15">
+            <a:extLst>
+              <a:ext uri="{FF2B5EF4-FFF2-40B4-BE49-F238E27FC236}">
+                <a16:creationId xmlns:a16="http://schemas.microsoft.com/office/drawing/2014/main" id="{107A2B26-4FDC-4B76-99F2-C7E07A64DA76}"/>
+              </a:ext>
+            </a:extLst>
+          </p:cNvPr>
+          <p:cNvSpPr/>
+          <p:nvPr/>
+        </p:nvSpPr>
+        <p:spPr>
+          <a:xfrm>
+            <a:off x="5484304" y="1461922"/>
+            <a:ext cx="651354" cy="612606"/>
+          </a:xfrm>
+          <a:prstGeom prst="ellipse">
+            <a:avLst/>
+          </a:prstGeom>
+          <a:noFill/>
+          <a:ln w="9525" cap="flat" cmpd="sng" algn="ctr">
+            <a:solidFill>
+              <a:schemeClr val="dk1"/>
+            </a:solidFill>
+            <a:prstDash val="solid"/>
+            <a:round/>
+            <a:headEnd type="none" w="med" len="med"/>
+            <a:tailEnd type="none" w="med" len="med"/>
+          </a:ln>
+        </p:spPr>
+        <p:style>
+          <a:lnRef idx="0">
+            <a:scrgbClr r="0" g="0" b="0"/>
+          </a:lnRef>
+          <a:fillRef idx="0">
+            <a:scrgbClr r="0" g="0" b="0"/>
+          </a:fillRef>
+          <a:effectRef idx="0">
+            <a:scrgbClr r="0" g="0" b="0"/>
+          </a:effectRef>
+          <a:fontRef idx="minor">
+            <a:schemeClr val="dk1"/>
+          </a:fontRef>
+        </p:style>
+        <p:txBody>
+          <a:bodyPr rtlCol="0" anchor="ctr"/>
+          <a:lstStyle/>
+          <a:p>
+            <a:pPr algn="ctr"/>
+            <a:endParaRPr lang="en-GB"/>
+          </a:p>
+        </p:txBody>
+      </p:sp>
+      <p:cxnSp>
+        <p:nvCxnSpPr>
+          <p:cNvPr id="18" name="Straight Arrow Connector 17">
+            <a:extLst>
+              <a:ext uri="{FF2B5EF4-FFF2-40B4-BE49-F238E27FC236}">
+                <a16:creationId xmlns:a16="http://schemas.microsoft.com/office/drawing/2014/main" id="{777D382E-E9F1-4EA8-80B1-BB62315DF411}"/>
+              </a:ext>
+            </a:extLst>
+          </p:cNvPr>
+          <p:cNvCxnSpPr>
+            <a:stCxn id="16" idx="4"/>
+          </p:cNvCxnSpPr>
+          <p:nvPr/>
+        </p:nvCxnSpPr>
+        <p:spPr>
+          <a:xfrm>
+            <a:off x="5809981" y="2074528"/>
+            <a:ext cx="150843" cy="1354472"/>
+          </a:xfrm>
+          <a:prstGeom prst="straightConnector1">
+            <a:avLst/>
+          </a:prstGeom>
+          <a:ln>
+            <a:tailEnd type="triangle"/>
+          </a:ln>
+        </p:spPr>
+        <p:style>
+          <a:lnRef idx="2">
+            <a:schemeClr val="dk1"/>
+          </a:lnRef>
+          <a:fillRef idx="0">
+            <a:schemeClr val="dk1"/>
+          </a:fillRef>
+          <a:effectRef idx="1">
+            <a:schemeClr val="dk1"/>
+          </a:effectRef>
+          <a:fontRef idx="minor">
+            <a:schemeClr val="tx1"/>
+          </a:fontRef>
+        </p:style>
+      </p:cxnSp>
+    </p:spTree>
+    <p:extLst>
+      <p:ext uri="{BB962C8B-B14F-4D97-AF65-F5344CB8AC3E}">
+        <p14:creationId xmlns:p14="http://schemas.microsoft.com/office/powerpoint/2010/main" val="3164338086"/>
+      </p:ext>
+    </p:extLst>
+  </p:cSld>
+  <p:clrMapOvr>
+    <a:masterClrMapping/>
+  </p:clrMapOvr>
+</p:sld>
+</file>
+
 <file path=ppt/slides/slide3.xml><?xml version="1.0" encoding="utf-8"?>
 <p:sld xmlns:a="http://schemas.openxmlformats.org/drawingml/2006/main" xmlns:r="http://schemas.openxmlformats.org/officeDocument/2006/relationships" xmlns:p="http://schemas.openxmlformats.org/presentationml/2006/main">
   <p:cSld>

</xml_diff>

<commit_message>
iniziato a cambiare screenshot tutorial
</commit_message>
<xml_diff>
--- a/screenshots/imgs.pptx
+++ b/screenshots/imgs.pptx
@@ -285,7 +285,7 @@
           <a:p>
             <a:fld id="{166DC043-4AEC-4A4E-AB79-0D54B7828DD9}" type="datetimeFigureOut">
               <a:rPr lang="en-GB" smtClean="0"/>
-              <a:t>29/06/2021</a:t>
+              <a:t>06/07/2021</a:t>
             </a:fld>
             <a:endParaRPr lang="en-GB"/>
           </a:p>
@@ -485,7 +485,7 @@
           <a:p>
             <a:fld id="{166DC043-4AEC-4A4E-AB79-0D54B7828DD9}" type="datetimeFigureOut">
               <a:rPr lang="en-GB" smtClean="0"/>
-              <a:t>29/06/2021</a:t>
+              <a:t>06/07/2021</a:t>
             </a:fld>
             <a:endParaRPr lang="en-GB"/>
           </a:p>
@@ -695,7 +695,7 @@
           <a:p>
             <a:fld id="{166DC043-4AEC-4A4E-AB79-0D54B7828DD9}" type="datetimeFigureOut">
               <a:rPr lang="en-GB" smtClean="0"/>
-              <a:t>29/06/2021</a:t>
+              <a:t>06/07/2021</a:t>
             </a:fld>
             <a:endParaRPr lang="en-GB"/>
           </a:p>
@@ -895,7 +895,7 @@
           <a:p>
             <a:fld id="{166DC043-4AEC-4A4E-AB79-0D54B7828DD9}" type="datetimeFigureOut">
               <a:rPr lang="en-GB" smtClean="0"/>
-              <a:t>29/06/2021</a:t>
+              <a:t>06/07/2021</a:t>
             </a:fld>
             <a:endParaRPr lang="en-GB"/>
           </a:p>
@@ -1171,7 +1171,7 @@
           <a:p>
             <a:fld id="{166DC043-4AEC-4A4E-AB79-0D54B7828DD9}" type="datetimeFigureOut">
               <a:rPr lang="en-GB" smtClean="0"/>
-              <a:t>29/06/2021</a:t>
+              <a:t>06/07/2021</a:t>
             </a:fld>
             <a:endParaRPr lang="en-GB"/>
           </a:p>
@@ -1439,7 +1439,7 @@
           <a:p>
             <a:fld id="{166DC043-4AEC-4A4E-AB79-0D54B7828DD9}" type="datetimeFigureOut">
               <a:rPr lang="en-GB" smtClean="0"/>
-              <a:t>29/06/2021</a:t>
+              <a:t>06/07/2021</a:t>
             </a:fld>
             <a:endParaRPr lang="en-GB"/>
           </a:p>
@@ -1854,7 +1854,7 @@
           <a:p>
             <a:fld id="{166DC043-4AEC-4A4E-AB79-0D54B7828DD9}" type="datetimeFigureOut">
               <a:rPr lang="en-GB" smtClean="0"/>
-              <a:t>29/06/2021</a:t>
+              <a:t>06/07/2021</a:t>
             </a:fld>
             <a:endParaRPr lang="en-GB"/>
           </a:p>
@@ -1996,7 +1996,7 @@
           <a:p>
             <a:fld id="{166DC043-4AEC-4A4E-AB79-0D54B7828DD9}" type="datetimeFigureOut">
               <a:rPr lang="en-GB" smtClean="0"/>
-              <a:t>29/06/2021</a:t>
+              <a:t>06/07/2021</a:t>
             </a:fld>
             <a:endParaRPr lang="en-GB"/>
           </a:p>
@@ -2109,7 +2109,7 @@
           <a:p>
             <a:fld id="{166DC043-4AEC-4A4E-AB79-0D54B7828DD9}" type="datetimeFigureOut">
               <a:rPr lang="en-GB" smtClean="0"/>
-              <a:t>29/06/2021</a:t>
+              <a:t>06/07/2021</a:t>
             </a:fld>
             <a:endParaRPr lang="en-GB"/>
           </a:p>
@@ -2422,7 +2422,7 @@
           <a:p>
             <a:fld id="{166DC043-4AEC-4A4E-AB79-0D54B7828DD9}" type="datetimeFigureOut">
               <a:rPr lang="en-GB" smtClean="0"/>
-              <a:t>29/06/2021</a:t>
+              <a:t>06/07/2021</a:t>
             </a:fld>
             <a:endParaRPr lang="en-GB"/>
           </a:p>
@@ -2711,7 +2711,7 @@
           <a:p>
             <a:fld id="{166DC043-4AEC-4A4E-AB79-0D54B7828DD9}" type="datetimeFigureOut">
               <a:rPr lang="en-GB" smtClean="0"/>
-              <a:t>29/06/2021</a:t>
+              <a:t>06/07/2021</a:t>
             </a:fld>
             <a:endParaRPr lang="en-GB"/>
           </a:p>
@@ -2954,7 +2954,7 @@
           <a:p>
             <a:fld id="{166DC043-4AEC-4A4E-AB79-0D54B7828DD9}" type="datetimeFigureOut">
               <a:rPr lang="en-GB" smtClean="0"/>
-              <a:t>29/06/2021</a:t>
+              <a:t>06/07/2021</a:t>
             </a:fld>
             <a:endParaRPr lang="en-GB"/>
           </a:p>
@@ -9821,10 +9821,10 @@
       </p:grpSpPr>
       <p:pic>
         <p:nvPicPr>
-          <p:cNvPr id="5" name="Picture 4" descr="Graphical user interface, table&#10;&#10;Description automatically generated with medium confidence">
-            <a:extLst>
-              <a:ext uri="{FF2B5EF4-FFF2-40B4-BE49-F238E27FC236}">
-                <a16:creationId xmlns:a16="http://schemas.microsoft.com/office/drawing/2014/main" id="{79AB261E-88BC-4B4D-96EC-D3FD9971EBED}"/>
+          <p:cNvPr id="3" name="Picture 2" descr="Graphical user interface&#10;&#10;Description automatically generated">
+            <a:extLst>
+              <a:ext uri="{FF2B5EF4-FFF2-40B4-BE49-F238E27FC236}">
+                <a16:creationId xmlns:a16="http://schemas.microsoft.com/office/drawing/2014/main" id="{ED2138F8-BD3C-4632-8FD6-325101CE0D57}"/>
               </a:ext>
             </a:extLst>
           </p:cNvPr>
@@ -9847,8 +9847,8 @@
         </p:blipFill>
         <p:spPr>
           <a:xfrm>
-            <a:off x="2972576" y="643466"/>
-            <a:ext cx="6246848" cy="5571067"/>
+            <a:off x="2269338" y="125261"/>
+            <a:ext cx="7526015" cy="6637990"/>
           </a:xfrm>
           <a:prstGeom prst="rect">
             <a:avLst/>
@@ -9869,8 +9869,8 @@
         </p:nvSpPr>
         <p:spPr>
           <a:xfrm>
-            <a:off x="6212910" y="2217107"/>
-            <a:ext cx="501041" cy="1828800"/>
+            <a:off x="4459265" y="4837134"/>
+            <a:ext cx="488515" cy="1283917"/>
           </a:xfrm>
           <a:prstGeom prst="rightBrace">
             <a:avLst>
@@ -9916,14 +9916,76 @@
         </p:nvSpPr>
         <p:spPr>
           <a:xfrm>
-            <a:off x="6980520" y="2855934"/>
+            <a:off x="5103306" y="5217090"/>
+            <a:ext cx="1086641" cy="369332"/>
+          </a:xfrm>
+          <a:prstGeom prst="rect">
+            <a:avLst/>
+          </a:prstGeom>
+        </p:spPr>
+        <p:style>
+          <a:lnRef idx="2">
+            <a:schemeClr val="dk1"/>
+          </a:lnRef>
+          <a:fillRef idx="1">
+            <a:schemeClr val="lt1"/>
+          </a:fillRef>
+          <a:effectRef idx="0">
+            <a:schemeClr val="dk1"/>
+          </a:effectRef>
+          <a:fontRef idx="minor">
+            <a:schemeClr val="dk1"/>
+          </a:fontRef>
+        </p:style>
+        <p:txBody>
+          <a:bodyPr wrap="square" rtlCol="0">
+            <a:spAutoFit/>
+          </a:bodyPr>
+          <a:lstStyle/>
+          <a:p>
+            <a:r>
+              <a:rPr lang="it-IT" dirty="0" err="1"/>
+              <a:t>Numeric</a:t>
+            </a:r>
+            <a:endParaRPr lang="en-GB" dirty="0"/>
+          </a:p>
+        </p:txBody>
+      </p:sp>
+      <p:sp>
+        <p:nvSpPr>
+          <p:cNvPr id="15" name="TextBox 14">
+            <a:extLst>
+              <a:ext uri="{FF2B5EF4-FFF2-40B4-BE49-F238E27FC236}">
+                <a16:creationId xmlns:a16="http://schemas.microsoft.com/office/drawing/2014/main" id="{6DE3E522-1E48-4593-BECB-FF5116C8A963}"/>
+              </a:ext>
+            </a:extLst>
+          </p:cNvPr>
+          <p:cNvSpPr txBox="1"/>
+          <p:nvPr/>
+        </p:nvSpPr>
+        <p:spPr>
+          <a:xfrm>
+            <a:off x="5539211" y="4135677"/>
             <a:ext cx="986167" cy="369332"/>
           </a:xfrm>
           <a:prstGeom prst="rect">
             <a:avLst/>
           </a:prstGeom>
-          <a:noFill/>
-        </p:spPr>
+        </p:spPr>
+        <p:style>
+          <a:lnRef idx="2">
+            <a:schemeClr val="dk1"/>
+          </a:lnRef>
+          <a:fillRef idx="1">
+            <a:schemeClr val="lt1"/>
+          </a:fillRef>
+          <a:effectRef idx="0">
+            <a:schemeClr val="dk1"/>
+          </a:effectRef>
+          <a:fontRef idx="minor">
+            <a:schemeClr val="dk1"/>
+          </a:fontRef>
+        </p:style>
         <p:txBody>
           <a:bodyPr wrap="none" rtlCol="0">
             <a:spAutoFit/>
@@ -9940,10 +10002,10 @@
       </p:sp>
       <p:cxnSp>
         <p:nvCxnSpPr>
-          <p:cNvPr id="9" name="Straight Arrow Connector 8">
-            <a:extLst>
-              <a:ext uri="{FF2B5EF4-FFF2-40B4-BE49-F238E27FC236}">
-                <a16:creationId xmlns:a16="http://schemas.microsoft.com/office/drawing/2014/main" id="{6F2D7403-04F4-4005-8848-757835A035F4}"/>
+          <p:cNvPr id="16" name="Straight Arrow Connector 15">
+            <a:extLst>
+              <a:ext uri="{FF2B5EF4-FFF2-40B4-BE49-F238E27FC236}">
+                <a16:creationId xmlns:a16="http://schemas.microsoft.com/office/drawing/2014/main" id="{66708685-2BA4-4E28-9767-C5ADC52D2172}"/>
               </a:ext>
             </a:extLst>
           </p:cNvPr>
@@ -9953,85 +10015,8 @@
           <p:nvPr/>
         </p:nvCxnSpPr>
         <p:spPr>
-          <a:xfrm flipH="1">
-            <a:off x="5887235" y="1640910"/>
-            <a:ext cx="1002080" cy="0"/>
-          </a:xfrm>
-          <a:prstGeom prst="straightConnector1">
-            <a:avLst/>
-          </a:prstGeom>
-          <a:ln>
-            <a:tailEnd type="triangle"/>
-          </a:ln>
-        </p:spPr>
-        <p:style>
-          <a:lnRef idx="3">
-            <a:schemeClr val="dk1"/>
-          </a:lnRef>
-          <a:fillRef idx="0">
-            <a:schemeClr val="dk1"/>
-          </a:fillRef>
-          <a:effectRef idx="2">
-            <a:schemeClr val="dk1"/>
-          </a:effectRef>
-          <a:fontRef idx="minor">
-            <a:schemeClr val="tx1"/>
-          </a:fontRef>
-        </p:style>
-      </p:cxnSp>
-      <p:sp>
-        <p:nvSpPr>
-          <p:cNvPr id="15" name="TextBox 14">
-            <a:extLst>
-              <a:ext uri="{FF2B5EF4-FFF2-40B4-BE49-F238E27FC236}">
-                <a16:creationId xmlns:a16="http://schemas.microsoft.com/office/drawing/2014/main" id="{6DE3E522-1E48-4593-BECB-FF5116C8A963}"/>
-              </a:ext>
-            </a:extLst>
-          </p:cNvPr>
-          <p:cNvSpPr txBox="1"/>
-          <p:nvPr/>
-        </p:nvSpPr>
-        <p:spPr>
-          <a:xfrm>
-            <a:off x="6980519" y="1456244"/>
-            <a:ext cx="986167" cy="369332"/>
-          </a:xfrm>
-          <a:prstGeom prst="rect">
-            <a:avLst/>
-          </a:prstGeom>
-          <a:noFill/>
-        </p:spPr>
-        <p:txBody>
-          <a:bodyPr wrap="none" rtlCol="0">
-            <a:spAutoFit/>
-          </a:bodyPr>
-          <a:lstStyle/>
-          <a:p>
-            <a:r>
-              <a:rPr lang="it-IT" dirty="0" err="1"/>
-              <a:t>Numeric</a:t>
-            </a:r>
-            <a:endParaRPr lang="en-GB" dirty="0"/>
-          </a:p>
-        </p:txBody>
-      </p:sp>
-      <p:cxnSp>
-        <p:nvCxnSpPr>
-          <p:cNvPr id="16" name="Straight Arrow Connector 15">
-            <a:extLst>
-              <a:ext uri="{FF2B5EF4-FFF2-40B4-BE49-F238E27FC236}">
-                <a16:creationId xmlns:a16="http://schemas.microsoft.com/office/drawing/2014/main" id="{66708685-2BA4-4E28-9767-C5ADC52D2172}"/>
-              </a:ext>
-            </a:extLst>
-          </p:cNvPr>
-          <p:cNvCxnSpPr>
-            <a:cxnSpLocks/>
-          </p:cNvCxnSpPr>
-          <p:nvPr/>
-        </p:nvCxnSpPr>
-        <p:spPr>
           <a:xfrm flipH="1" flipV="1">
-            <a:off x="5398721" y="2006252"/>
+            <a:off x="3957413" y="4685685"/>
             <a:ext cx="1490594" cy="10438"/>
           </a:xfrm>
           <a:prstGeom prst="straightConnector1">
@@ -10072,8 +10057,8 @@
         </p:nvCxnSpPr>
         <p:spPr>
           <a:xfrm flipH="1">
-            <a:off x="5887234" y="1640910"/>
-            <a:ext cx="977029" cy="0"/>
+            <a:off x="4283900" y="4378984"/>
+            <a:ext cx="1164107" cy="0"/>
           </a:xfrm>
           <a:prstGeom prst="straightConnector1">
             <a:avLst/>
@@ -10111,14 +10096,27 @@
         </p:nvSpPr>
         <p:spPr>
           <a:xfrm>
-            <a:off x="7005571" y="1800895"/>
+            <a:off x="5564263" y="4480328"/>
             <a:ext cx="625684" cy="369332"/>
           </a:xfrm>
           <a:prstGeom prst="rect">
             <a:avLst/>
           </a:prstGeom>
-          <a:noFill/>
-        </p:spPr>
+        </p:spPr>
+        <p:style>
+          <a:lnRef idx="2">
+            <a:schemeClr val="dk1"/>
+          </a:lnRef>
+          <a:fillRef idx="1">
+            <a:schemeClr val="lt1"/>
+          </a:fillRef>
+          <a:effectRef idx="0">
+            <a:schemeClr val="dk1"/>
+          </a:effectRef>
+          <a:fontRef idx="minor">
+            <a:schemeClr val="dk1"/>
+          </a:fontRef>
+        </p:style>
         <p:txBody>
           <a:bodyPr wrap="none" rtlCol="0">
             <a:spAutoFit/>

</xml_diff>

<commit_message>
end of proc sql interf
</commit_message>
<xml_diff>
--- a/screenshots/imgs.pptx
+++ b/screenshots/imgs.pptx
@@ -32,6 +32,7 @@
     <p:sldId id="280" r:id="rId26"/>
     <p:sldId id="281" r:id="rId27"/>
     <p:sldId id="282" r:id="rId28"/>
+    <p:sldId id="283" r:id="rId29"/>
   </p:sldIdLst>
   <p:sldSz cx="12192000" cy="6858000"/>
   <p:notesSz cx="6858000" cy="9144000"/>
@@ -13887,6 +13888,726 @@
 </p:sld>
 </file>
 
+<file path=ppt/slides/slide28.xml><?xml version="1.0" encoding="utf-8"?>
+<p:sld xmlns:a="http://schemas.openxmlformats.org/drawingml/2006/main" xmlns:r="http://schemas.openxmlformats.org/officeDocument/2006/relationships" xmlns:p="http://schemas.openxmlformats.org/presentationml/2006/main">
+  <p:cSld>
+    <p:spTree>
+      <p:nvGrpSpPr>
+        <p:cNvPr id="1" name=""/>
+        <p:cNvGrpSpPr/>
+        <p:nvPr/>
+      </p:nvGrpSpPr>
+      <p:grpSpPr>
+        <a:xfrm>
+          <a:off x="0" y="0"/>
+          <a:ext cx="0" cy="0"/>
+          <a:chOff x="0" y="0"/>
+          <a:chExt cx="0" cy="0"/>
+        </a:xfrm>
+      </p:grpSpPr>
+      <p:pic>
+        <p:nvPicPr>
+          <p:cNvPr id="5" name="Picture 4" descr="Text, timeline&#10;&#10;Description automatically generated">
+            <a:extLst>
+              <a:ext uri="{FF2B5EF4-FFF2-40B4-BE49-F238E27FC236}">
+                <a16:creationId xmlns:a16="http://schemas.microsoft.com/office/drawing/2014/main" id="{FB24F6AF-7DD8-491E-99D7-DFB858051335}"/>
+              </a:ext>
+            </a:extLst>
+          </p:cNvPr>
+          <p:cNvPicPr>
+            <a:picLocks noChangeAspect="1"/>
+          </p:cNvPicPr>
+          <p:nvPr/>
+        </p:nvPicPr>
+        <p:blipFill>
+          <a:blip r:embed="rId2">
+            <a:extLst>
+              <a:ext uri="{28A0092B-C50C-407E-A947-70E740481C1C}">
+                <a14:useLocalDpi xmlns:a14="http://schemas.microsoft.com/office/drawing/2010/main" val="0"/>
+              </a:ext>
+            </a:extLst>
+          </a:blip>
+          <a:stretch>
+            <a:fillRect/>
+          </a:stretch>
+        </p:blipFill>
+        <p:spPr>
+          <a:xfrm>
+            <a:off x="3485785" y="399627"/>
+            <a:ext cx="5220429" cy="6058746"/>
+          </a:xfrm>
+          <a:prstGeom prst="rect">
+            <a:avLst/>
+          </a:prstGeom>
+        </p:spPr>
+      </p:pic>
+      <p:sp>
+        <p:nvSpPr>
+          <p:cNvPr id="6" name="Rectangle 5">
+            <a:extLst>
+              <a:ext uri="{FF2B5EF4-FFF2-40B4-BE49-F238E27FC236}">
+                <a16:creationId xmlns:a16="http://schemas.microsoft.com/office/drawing/2014/main" id="{6D616E8E-BAA7-49F0-86BC-B690469FF330}"/>
+              </a:ext>
+            </a:extLst>
+          </p:cNvPr>
+          <p:cNvSpPr/>
+          <p:nvPr/>
+        </p:nvSpPr>
+        <p:spPr>
+          <a:xfrm>
+            <a:off x="4203032" y="489284"/>
+            <a:ext cx="1475873" cy="216569"/>
+          </a:xfrm>
+          <a:prstGeom prst="rect">
+            <a:avLst/>
+          </a:prstGeom>
+          <a:noFill/>
+          <a:ln w="28575" cap="flat" cmpd="sng" algn="ctr">
+            <a:solidFill>
+              <a:schemeClr val="accent2"/>
+            </a:solidFill>
+            <a:prstDash val="solid"/>
+            <a:round/>
+            <a:headEnd type="none" w="med" len="med"/>
+            <a:tailEnd type="none" w="med" len="med"/>
+          </a:ln>
+        </p:spPr>
+        <p:style>
+          <a:lnRef idx="0">
+            <a:scrgbClr r="0" g="0" b="0"/>
+          </a:lnRef>
+          <a:fillRef idx="0">
+            <a:scrgbClr r="0" g="0" b="0"/>
+          </a:fillRef>
+          <a:effectRef idx="0">
+            <a:scrgbClr r="0" g="0" b="0"/>
+          </a:effectRef>
+          <a:fontRef idx="minor">
+            <a:schemeClr val="accent2"/>
+          </a:fontRef>
+        </p:style>
+        <p:txBody>
+          <a:bodyPr rtlCol="0" anchor="ctr"/>
+          <a:lstStyle/>
+          <a:p>
+            <a:pPr algn="ctr"/>
+            <a:endParaRPr lang="en-GB"/>
+          </a:p>
+        </p:txBody>
+      </p:sp>
+      <p:sp>
+        <p:nvSpPr>
+          <p:cNvPr id="7" name="Rectangle 6">
+            <a:extLst>
+              <a:ext uri="{FF2B5EF4-FFF2-40B4-BE49-F238E27FC236}">
+                <a16:creationId xmlns:a16="http://schemas.microsoft.com/office/drawing/2014/main" id="{0624B4CD-9245-40AB-B454-6043848625A8}"/>
+              </a:ext>
+            </a:extLst>
+          </p:cNvPr>
+          <p:cNvSpPr/>
+          <p:nvPr/>
+        </p:nvSpPr>
+        <p:spPr>
+          <a:xfrm>
+            <a:off x="4203032" y="3272589"/>
+            <a:ext cx="1892968" cy="156411"/>
+          </a:xfrm>
+          <a:prstGeom prst="rect">
+            <a:avLst/>
+          </a:prstGeom>
+          <a:noFill/>
+          <a:ln w="28575" cap="flat" cmpd="sng" algn="ctr">
+            <a:solidFill>
+              <a:schemeClr val="accent2"/>
+            </a:solidFill>
+            <a:prstDash val="solid"/>
+            <a:round/>
+            <a:headEnd type="none" w="med" len="med"/>
+            <a:tailEnd type="none" w="med" len="med"/>
+          </a:ln>
+        </p:spPr>
+        <p:style>
+          <a:lnRef idx="0">
+            <a:scrgbClr r="0" g="0" b="0"/>
+          </a:lnRef>
+          <a:fillRef idx="0">
+            <a:scrgbClr r="0" g="0" b="0"/>
+          </a:fillRef>
+          <a:effectRef idx="0">
+            <a:scrgbClr r="0" g="0" b="0"/>
+          </a:effectRef>
+          <a:fontRef idx="minor">
+            <a:schemeClr val="accent2"/>
+          </a:fontRef>
+        </p:style>
+        <p:txBody>
+          <a:bodyPr rtlCol="0" anchor="ctr"/>
+          <a:lstStyle/>
+          <a:p>
+            <a:pPr algn="ctr"/>
+            <a:endParaRPr lang="en-GB"/>
+          </a:p>
+        </p:txBody>
+      </p:sp>
+      <p:cxnSp>
+        <p:nvCxnSpPr>
+          <p:cNvPr id="9" name="Straight Arrow Connector 8">
+            <a:extLst>
+              <a:ext uri="{FF2B5EF4-FFF2-40B4-BE49-F238E27FC236}">
+                <a16:creationId xmlns:a16="http://schemas.microsoft.com/office/drawing/2014/main" id="{980D6115-C43B-4E99-8716-65C7FF25F179}"/>
+              </a:ext>
+            </a:extLst>
+          </p:cNvPr>
+          <p:cNvCxnSpPr>
+            <a:cxnSpLocks/>
+          </p:cNvCxnSpPr>
+          <p:nvPr/>
+        </p:nvCxnSpPr>
+        <p:spPr>
+          <a:xfrm flipH="1" flipV="1">
+            <a:off x="5775158" y="585538"/>
+            <a:ext cx="2294021" cy="120315"/>
+          </a:xfrm>
+          <a:prstGeom prst="straightConnector1">
+            <a:avLst/>
+          </a:prstGeom>
+          <a:ln>
+            <a:tailEnd type="triangle"/>
+          </a:ln>
+        </p:spPr>
+        <p:style>
+          <a:lnRef idx="2">
+            <a:schemeClr val="accent2"/>
+          </a:lnRef>
+          <a:fillRef idx="0">
+            <a:schemeClr val="accent2"/>
+          </a:fillRef>
+          <a:effectRef idx="1">
+            <a:schemeClr val="accent2"/>
+          </a:effectRef>
+          <a:fontRef idx="minor">
+            <a:schemeClr val="tx1"/>
+          </a:fontRef>
+        </p:style>
+      </p:cxnSp>
+      <p:cxnSp>
+        <p:nvCxnSpPr>
+          <p:cNvPr id="11" name="Straight Arrow Connector 10">
+            <a:extLst>
+              <a:ext uri="{FF2B5EF4-FFF2-40B4-BE49-F238E27FC236}">
+                <a16:creationId xmlns:a16="http://schemas.microsoft.com/office/drawing/2014/main" id="{B2BCFA63-BDCE-49EA-A425-0515A080D699}"/>
+              </a:ext>
+            </a:extLst>
+          </p:cNvPr>
+          <p:cNvCxnSpPr>
+            <a:cxnSpLocks/>
+          </p:cNvCxnSpPr>
+          <p:nvPr/>
+        </p:nvCxnSpPr>
+        <p:spPr>
+          <a:xfrm flipH="1">
+            <a:off x="7210926" y="701842"/>
+            <a:ext cx="858253" cy="533400"/>
+          </a:xfrm>
+          <a:prstGeom prst="straightConnector1">
+            <a:avLst/>
+          </a:prstGeom>
+          <a:ln>
+            <a:tailEnd type="triangle"/>
+          </a:ln>
+        </p:spPr>
+        <p:style>
+          <a:lnRef idx="2">
+            <a:schemeClr val="accent2"/>
+          </a:lnRef>
+          <a:fillRef idx="0">
+            <a:schemeClr val="accent2"/>
+          </a:fillRef>
+          <a:effectRef idx="1">
+            <a:schemeClr val="accent2"/>
+          </a:effectRef>
+          <a:fontRef idx="minor">
+            <a:schemeClr val="tx1"/>
+          </a:fontRef>
+        </p:style>
+      </p:cxnSp>
+      <p:cxnSp>
+        <p:nvCxnSpPr>
+          <p:cNvPr id="14" name="Straight Arrow Connector 13">
+            <a:extLst>
+              <a:ext uri="{FF2B5EF4-FFF2-40B4-BE49-F238E27FC236}">
+                <a16:creationId xmlns:a16="http://schemas.microsoft.com/office/drawing/2014/main" id="{520315AD-31F7-42D2-AAB3-DF1125EB67E6}"/>
+              </a:ext>
+            </a:extLst>
+          </p:cNvPr>
+          <p:cNvCxnSpPr>
+            <a:cxnSpLocks/>
+          </p:cNvCxnSpPr>
+          <p:nvPr/>
+        </p:nvCxnSpPr>
+        <p:spPr>
+          <a:xfrm flipH="1" flipV="1">
+            <a:off x="6136105" y="3405651"/>
+            <a:ext cx="2294021" cy="120315"/>
+          </a:xfrm>
+          <a:prstGeom prst="straightConnector1">
+            <a:avLst/>
+          </a:prstGeom>
+          <a:ln>
+            <a:tailEnd type="triangle"/>
+          </a:ln>
+        </p:spPr>
+        <p:style>
+          <a:lnRef idx="2">
+            <a:schemeClr val="accent2"/>
+          </a:lnRef>
+          <a:fillRef idx="0">
+            <a:schemeClr val="accent2"/>
+          </a:fillRef>
+          <a:effectRef idx="1">
+            <a:schemeClr val="accent2"/>
+          </a:effectRef>
+          <a:fontRef idx="minor">
+            <a:schemeClr val="tx1"/>
+          </a:fontRef>
+        </p:style>
+      </p:cxnSp>
+      <p:cxnSp>
+        <p:nvCxnSpPr>
+          <p:cNvPr id="15" name="Straight Arrow Connector 14">
+            <a:extLst>
+              <a:ext uri="{FF2B5EF4-FFF2-40B4-BE49-F238E27FC236}">
+                <a16:creationId xmlns:a16="http://schemas.microsoft.com/office/drawing/2014/main" id="{EFE30E60-105D-4BAC-AD3E-B536D500E2A3}"/>
+              </a:ext>
+            </a:extLst>
+          </p:cNvPr>
+          <p:cNvCxnSpPr>
+            <a:cxnSpLocks/>
+          </p:cNvCxnSpPr>
+          <p:nvPr/>
+        </p:nvCxnSpPr>
+        <p:spPr>
+          <a:xfrm flipH="1">
+            <a:off x="7571873" y="3521955"/>
+            <a:ext cx="858253" cy="533400"/>
+          </a:xfrm>
+          <a:prstGeom prst="straightConnector1">
+            <a:avLst/>
+          </a:prstGeom>
+          <a:ln>
+            <a:tailEnd type="triangle"/>
+          </a:ln>
+        </p:spPr>
+        <p:style>
+          <a:lnRef idx="2">
+            <a:schemeClr val="accent2"/>
+          </a:lnRef>
+          <a:fillRef idx="0">
+            <a:schemeClr val="accent2"/>
+          </a:fillRef>
+          <a:effectRef idx="1">
+            <a:schemeClr val="accent2"/>
+          </a:effectRef>
+          <a:fontRef idx="minor">
+            <a:schemeClr val="tx1"/>
+          </a:fontRef>
+        </p:style>
+      </p:cxnSp>
+      <p:sp>
+        <p:nvSpPr>
+          <p:cNvPr id="16" name="TextBox 15">
+            <a:extLst>
+              <a:ext uri="{FF2B5EF4-FFF2-40B4-BE49-F238E27FC236}">
+                <a16:creationId xmlns:a16="http://schemas.microsoft.com/office/drawing/2014/main" id="{80B40740-D092-45E4-A1B7-23AD5719EA05}"/>
+              </a:ext>
+            </a:extLst>
+          </p:cNvPr>
+          <p:cNvSpPr txBox="1"/>
+          <p:nvPr/>
+        </p:nvSpPr>
+        <p:spPr>
+          <a:xfrm>
+            <a:off x="8165433" y="517176"/>
+            <a:ext cx="1976550" cy="861774"/>
+          </a:xfrm>
+          <a:prstGeom prst="rect">
+            <a:avLst/>
+          </a:prstGeom>
+          <a:noFill/>
+        </p:spPr>
+        <p:txBody>
+          <a:bodyPr wrap="square" rtlCol="0">
+            <a:spAutoFit/>
+          </a:bodyPr>
+          <a:lstStyle/>
+          <a:p>
+            <a:r>
+              <a:rPr lang="it-IT" sz="1000" dirty="0"/>
+              <a:t>The macro </a:t>
+            </a:r>
+            <a:r>
+              <a:rPr lang="it-IT" sz="1000" i="1" dirty="0" err="1"/>
+              <a:t>check_empty</a:t>
+            </a:r>
+            <a:r>
+              <a:rPr lang="it-IT" sz="1000" dirty="0"/>
+              <a:t> </a:t>
+            </a:r>
+            <a:r>
+              <a:rPr lang="it-IT" sz="1000" dirty="0" err="1"/>
+              <a:t>processes</a:t>
+            </a:r>
+            <a:r>
+              <a:rPr lang="it-IT" sz="1000" dirty="0"/>
+              <a:t> the dataset </a:t>
+            </a:r>
+            <a:r>
+              <a:rPr lang="it-IT" sz="1000" dirty="0" err="1"/>
+              <a:t>called</a:t>
+            </a:r>
+            <a:r>
+              <a:rPr lang="it-IT" sz="1000" dirty="0"/>
+              <a:t> </a:t>
+            </a:r>
+            <a:r>
+              <a:rPr lang="it-IT" sz="1000" i="1" dirty="0"/>
+              <a:t>trial.</a:t>
+            </a:r>
+          </a:p>
+          <a:p>
+            <a:r>
+              <a:rPr lang="it-IT" sz="1000" dirty="0"/>
+              <a:t>The note lists the </a:t>
+            </a:r>
+            <a:r>
+              <a:rPr lang="it-IT" sz="1000" dirty="0" err="1"/>
+              <a:t>details</a:t>
+            </a:r>
+            <a:r>
+              <a:rPr lang="it-IT" sz="1000" dirty="0"/>
+              <a:t> </a:t>
+            </a:r>
+            <a:r>
+              <a:rPr lang="it-IT" sz="1000" dirty="0" err="1"/>
+              <a:t>related</a:t>
+            </a:r>
+            <a:r>
+              <a:rPr lang="it-IT" sz="1000" dirty="0"/>
+              <a:t> to the processing time </a:t>
+            </a:r>
+            <a:r>
+              <a:rPr lang="it-IT" sz="1000" dirty="0" err="1"/>
+              <a:t>required</a:t>
+            </a:r>
+            <a:r>
+              <a:rPr lang="it-IT" sz="1000" dirty="0"/>
+              <a:t> to </a:t>
+            </a:r>
+            <a:r>
+              <a:rPr lang="it-IT" sz="1000" dirty="0" err="1"/>
+              <a:t>execute</a:t>
+            </a:r>
+            <a:r>
+              <a:rPr lang="it-IT" sz="1000" dirty="0"/>
+              <a:t> the macro. </a:t>
+            </a:r>
+            <a:endParaRPr lang="en-GB" sz="1000" dirty="0"/>
+          </a:p>
+        </p:txBody>
+      </p:sp>
+      <p:sp>
+        <p:nvSpPr>
+          <p:cNvPr id="17" name="TextBox 16">
+            <a:extLst>
+              <a:ext uri="{FF2B5EF4-FFF2-40B4-BE49-F238E27FC236}">
+                <a16:creationId xmlns:a16="http://schemas.microsoft.com/office/drawing/2014/main" id="{C70211BF-8CEC-46F8-8797-CD52FF3E671B}"/>
+              </a:ext>
+            </a:extLst>
+          </p:cNvPr>
+          <p:cNvSpPr txBox="1"/>
+          <p:nvPr/>
+        </p:nvSpPr>
+        <p:spPr>
+          <a:xfrm>
+            <a:off x="8430126" y="3350794"/>
+            <a:ext cx="1976550" cy="861774"/>
+          </a:xfrm>
+          <a:prstGeom prst="rect">
+            <a:avLst/>
+          </a:prstGeom>
+          <a:noFill/>
+        </p:spPr>
+        <p:txBody>
+          <a:bodyPr wrap="square" rtlCol="0">
+            <a:spAutoFit/>
+          </a:bodyPr>
+          <a:lstStyle/>
+          <a:p>
+            <a:r>
+              <a:rPr lang="it-IT" sz="1000" dirty="0"/>
+              <a:t>The macro </a:t>
+            </a:r>
+            <a:r>
+              <a:rPr lang="it-IT" sz="1000" i="1" dirty="0" err="1"/>
+              <a:t>check_empty</a:t>
+            </a:r>
+            <a:r>
+              <a:rPr lang="it-IT" sz="1000" dirty="0"/>
+              <a:t> </a:t>
+            </a:r>
+            <a:r>
+              <a:rPr lang="it-IT" sz="1000" dirty="0" err="1"/>
+              <a:t>processes</a:t>
+            </a:r>
+            <a:r>
+              <a:rPr lang="it-IT" sz="1000" dirty="0"/>
+              <a:t> the dataset </a:t>
+            </a:r>
+            <a:r>
+              <a:rPr lang="it-IT" sz="1000" dirty="0" err="1"/>
+              <a:t>called</a:t>
+            </a:r>
+            <a:r>
+              <a:rPr lang="it-IT" sz="1000" dirty="0"/>
+              <a:t> </a:t>
+            </a:r>
+            <a:r>
+              <a:rPr lang="it-IT" sz="1000" i="1" dirty="0" err="1"/>
+              <a:t>hydro_wind</a:t>
+            </a:r>
+            <a:r>
+              <a:rPr lang="it-IT" sz="1000" i="1" dirty="0"/>
+              <a:t> .</a:t>
+            </a:r>
+          </a:p>
+          <a:p>
+            <a:r>
+              <a:rPr lang="it-IT" sz="1000" dirty="0"/>
+              <a:t>The note lists the </a:t>
+            </a:r>
+            <a:r>
+              <a:rPr lang="it-IT" sz="1000" dirty="0" err="1"/>
+              <a:t>details</a:t>
+            </a:r>
+            <a:r>
+              <a:rPr lang="it-IT" sz="1000" dirty="0"/>
+              <a:t> </a:t>
+            </a:r>
+            <a:r>
+              <a:rPr lang="it-IT" sz="1000" dirty="0" err="1"/>
+              <a:t>related</a:t>
+            </a:r>
+            <a:r>
+              <a:rPr lang="it-IT" sz="1000" dirty="0"/>
+              <a:t> to the processing time </a:t>
+            </a:r>
+            <a:r>
+              <a:rPr lang="it-IT" sz="1000" dirty="0" err="1"/>
+              <a:t>required</a:t>
+            </a:r>
+            <a:r>
+              <a:rPr lang="it-IT" sz="1000" dirty="0"/>
+              <a:t> to </a:t>
+            </a:r>
+            <a:r>
+              <a:rPr lang="it-IT" sz="1000" dirty="0" err="1"/>
+              <a:t>execute</a:t>
+            </a:r>
+            <a:r>
+              <a:rPr lang="it-IT" sz="1000" dirty="0"/>
+              <a:t> the macro.</a:t>
+            </a:r>
+            <a:endParaRPr lang="en-GB" sz="1000" dirty="0"/>
+          </a:p>
+        </p:txBody>
+      </p:sp>
+      <p:cxnSp>
+        <p:nvCxnSpPr>
+          <p:cNvPr id="19" name="Straight Arrow Connector 18">
+            <a:extLst>
+              <a:ext uri="{FF2B5EF4-FFF2-40B4-BE49-F238E27FC236}">
+                <a16:creationId xmlns:a16="http://schemas.microsoft.com/office/drawing/2014/main" id="{9DF89E65-E1E1-41F3-A2A6-A879C298D381}"/>
+              </a:ext>
+            </a:extLst>
+          </p:cNvPr>
+          <p:cNvCxnSpPr/>
+          <p:nvPr/>
+        </p:nvCxnSpPr>
+        <p:spPr>
+          <a:xfrm flipH="1">
+            <a:off x="6713621" y="3104147"/>
+            <a:ext cx="1612232" cy="96253"/>
+          </a:xfrm>
+          <a:prstGeom prst="straightConnector1">
+            <a:avLst/>
+          </a:prstGeom>
+          <a:ln>
+            <a:tailEnd type="triangle"/>
+          </a:ln>
+        </p:spPr>
+        <p:style>
+          <a:lnRef idx="3">
+            <a:schemeClr val="accent1"/>
+          </a:lnRef>
+          <a:fillRef idx="0">
+            <a:schemeClr val="accent1"/>
+          </a:fillRef>
+          <a:effectRef idx="2">
+            <a:schemeClr val="accent1"/>
+          </a:effectRef>
+          <a:fontRef idx="minor">
+            <a:schemeClr val="tx1"/>
+          </a:fontRef>
+        </p:style>
+      </p:cxnSp>
+      <p:sp>
+        <p:nvSpPr>
+          <p:cNvPr id="20" name="TextBox 19">
+            <a:extLst>
+              <a:ext uri="{FF2B5EF4-FFF2-40B4-BE49-F238E27FC236}">
+                <a16:creationId xmlns:a16="http://schemas.microsoft.com/office/drawing/2014/main" id="{C4FE3C72-B883-46CA-A137-71F907FF4ABF}"/>
+              </a:ext>
+            </a:extLst>
+          </p:cNvPr>
+          <p:cNvSpPr txBox="1"/>
+          <p:nvPr/>
+        </p:nvSpPr>
+        <p:spPr>
+          <a:xfrm>
+            <a:off x="8325853" y="2973342"/>
+            <a:ext cx="2864887" cy="261610"/>
+          </a:xfrm>
+          <a:prstGeom prst="rect">
+            <a:avLst/>
+          </a:prstGeom>
+          <a:noFill/>
+        </p:spPr>
+        <p:txBody>
+          <a:bodyPr wrap="none" rtlCol="0">
+            <a:spAutoFit/>
+          </a:bodyPr>
+          <a:lstStyle/>
+          <a:p>
+            <a:r>
+              <a:rPr lang="it-IT" sz="1100" dirty="0"/>
+              <a:t>The </a:t>
+            </a:r>
+            <a:r>
+              <a:rPr lang="it-IT" sz="1100" dirty="0" err="1"/>
+              <a:t>message</a:t>
+            </a:r>
+            <a:r>
+              <a:rPr lang="it-IT" sz="1100" dirty="0"/>
+              <a:t> output after the macro </a:t>
+            </a:r>
+            <a:r>
+              <a:rPr lang="it-IT" sz="1100" dirty="0" err="1"/>
+              <a:t>execution</a:t>
+            </a:r>
+            <a:endParaRPr lang="en-GB" sz="1100" dirty="0"/>
+          </a:p>
+        </p:txBody>
+      </p:sp>
+      <p:cxnSp>
+        <p:nvCxnSpPr>
+          <p:cNvPr id="22" name="Straight Arrow Connector 21">
+            <a:extLst>
+              <a:ext uri="{FF2B5EF4-FFF2-40B4-BE49-F238E27FC236}">
+                <a16:creationId xmlns:a16="http://schemas.microsoft.com/office/drawing/2014/main" id="{76E4BBD6-CC19-41F5-B096-2FA8E2916625}"/>
+              </a:ext>
+            </a:extLst>
+          </p:cNvPr>
+          <p:cNvCxnSpPr/>
+          <p:nvPr/>
+        </p:nvCxnSpPr>
+        <p:spPr>
+          <a:xfrm flipH="1">
+            <a:off x="7317886" y="5803945"/>
+            <a:ext cx="1612232" cy="96253"/>
+          </a:xfrm>
+          <a:prstGeom prst="straightConnector1">
+            <a:avLst/>
+          </a:prstGeom>
+          <a:ln>
+            <a:tailEnd type="triangle"/>
+          </a:ln>
+        </p:spPr>
+        <p:style>
+          <a:lnRef idx="3">
+            <a:schemeClr val="accent1"/>
+          </a:lnRef>
+          <a:fillRef idx="0">
+            <a:schemeClr val="accent1"/>
+          </a:fillRef>
+          <a:effectRef idx="2">
+            <a:schemeClr val="accent1"/>
+          </a:effectRef>
+          <a:fontRef idx="minor">
+            <a:schemeClr val="tx1"/>
+          </a:fontRef>
+        </p:style>
+      </p:cxnSp>
+      <p:sp>
+        <p:nvSpPr>
+          <p:cNvPr id="23" name="TextBox 22">
+            <a:extLst>
+              <a:ext uri="{FF2B5EF4-FFF2-40B4-BE49-F238E27FC236}">
+                <a16:creationId xmlns:a16="http://schemas.microsoft.com/office/drawing/2014/main" id="{47BF8320-7CC7-44FC-86BC-8502FA2AC7F0}"/>
+              </a:ext>
+            </a:extLst>
+          </p:cNvPr>
+          <p:cNvSpPr txBox="1"/>
+          <p:nvPr/>
+        </p:nvSpPr>
+        <p:spPr>
+          <a:xfrm>
+            <a:off x="8930118" y="5673140"/>
+            <a:ext cx="2864887" cy="261610"/>
+          </a:xfrm>
+          <a:prstGeom prst="rect">
+            <a:avLst/>
+          </a:prstGeom>
+          <a:noFill/>
+        </p:spPr>
+        <p:txBody>
+          <a:bodyPr wrap="none" rtlCol="0">
+            <a:spAutoFit/>
+          </a:bodyPr>
+          <a:lstStyle/>
+          <a:p>
+            <a:r>
+              <a:rPr lang="it-IT" sz="1100" dirty="0"/>
+              <a:t>The </a:t>
+            </a:r>
+            <a:r>
+              <a:rPr lang="it-IT" sz="1100" dirty="0" err="1"/>
+              <a:t>message</a:t>
+            </a:r>
+            <a:r>
+              <a:rPr lang="it-IT" sz="1100" dirty="0"/>
+              <a:t> output after the macro </a:t>
+            </a:r>
+            <a:r>
+              <a:rPr lang="it-IT" sz="1100" dirty="0" err="1"/>
+              <a:t>execution</a:t>
+            </a:r>
+            <a:endParaRPr lang="en-GB" sz="1100" dirty="0"/>
+          </a:p>
+        </p:txBody>
+      </p:sp>
+    </p:spTree>
+    <p:extLst>
+      <p:ext uri="{BB962C8B-B14F-4D97-AF65-F5344CB8AC3E}">
+        <p14:creationId xmlns:p14="http://schemas.microsoft.com/office/powerpoint/2010/main" val="3705141805"/>
+      </p:ext>
+    </p:extLst>
+  </p:cSld>
+  <p:clrMapOvr>
+    <a:masterClrMapping/>
+  </p:clrMapOvr>
+</p:sld>
+</file>
+
 <file path=ppt/slides/slide3.xml><?xml version="1.0" encoding="utf-8"?>
 <p:sld xmlns:a="http://schemas.openxmlformats.org/drawingml/2006/main" xmlns:r="http://schemas.openxmlformats.org/officeDocument/2006/relationships" xmlns:p="http://schemas.openxmlformats.org/presentationml/2006/main">
   <p:cSld>

</xml_diff>